<commit_message>
Minor fixes in abstract ea
</commit_message>
<xml_diff>
--- a/efop/03/Absztakciós szintek a programozásban.pptx
+++ b/efop/03/Absztakciós szintek a programozásban.pptx
@@ -10,16 +10,18 @@
     <p:sldId id="258" r:id="rId4"/>
     <p:sldId id="259" r:id="rId5"/>
     <p:sldId id="260" r:id="rId6"/>
-    <p:sldId id="261" r:id="rId7"/>
-    <p:sldId id="262" r:id="rId8"/>
-    <p:sldId id="263" r:id="rId9"/>
-    <p:sldId id="264" r:id="rId10"/>
-    <p:sldId id="268" r:id="rId11"/>
-    <p:sldId id="265" r:id="rId12"/>
-    <p:sldId id="266" r:id="rId13"/>
-    <p:sldId id="267" r:id="rId14"/>
-    <p:sldId id="269" r:id="rId15"/>
-    <p:sldId id="270" r:id="rId16"/>
+    <p:sldId id="271" r:id="rId7"/>
+    <p:sldId id="261" r:id="rId8"/>
+    <p:sldId id="262" r:id="rId9"/>
+    <p:sldId id="263" r:id="rId10"/>
+    <p:sldId id="264" r:id="rId11"/>
+    <p:sldId id="268" r:id="rId12"/>
+    <p:sldId id="265" r:id="rId13"/>
+    <p:sldId id="266" r:id="rId14"/>
+    <p:sldId id="267" r:id="rId15"/>
+    <p:sldId id="269" r:id="rId16"/>
+    <p:sldId id="270" r:id="rId17"/>
+    <p:sldId id="272" r:id="rId18"/>
   </p:sldIdLst>
   <p:sldSz cx="12192000" cy="6858000"/>
   <p:notesSz cx="6858000" cy="9144000"/>
@@ -126,6 +128,18 @@
 </p:presentation>
 </file>
 
+<file path=ppt/commentAuthors.xml><?xml version="1.0" encoding="utf-8"?>
+<p:cmAuthorLst xmlns:a="http://schemas.openxmlformats.org/drawingml/2006/main" xmlns:r="http://schemas.openxmlformats.org/officeDocument/2006/relationships" xmlns:p="http://schemas.openxmlformats.org/presentationml/2006/main">
+  <p:cmAuthor id="1" name="Nagy, Andras (Architectural Modeling)" initials="NAM" lastIdx="1" clrIdx="0">
+    <p:extLst>
+      <p:ext uri="{19B8F6BF-5375-455C-9EA6-DF929625EA0E}">
+        <p15:presenceInfo xmlns:p15="http://schemas.microsoft.com/office/powerpoint/2012/main" userId="S-1-5-21-2066556833-122692393-484856235-46960" providerId="AD"/>
+      </p:ext>
+    </p:extLst>
+  </p:cmAuthor>
+</p:cmAuthorLst>
+</file>
+
 <file path=ppt/slideLayouts/slideLayout1.xml><?xml version="1.0" encoding="utf-8"?>
 <p:sldLayout xmlns:a="http://schemas.openxmlformats.org/drawingml/2006/main" xmlns:r="http://schemas.openxmlformats.org/officeDocument/2006/relationships" xmlns:p="http://schemas.openxmlformats.org/presentationml/2006/main" type="title" preserve="1">
   <p:cSld name="Title Slide">
@@ -257,7 +271,7 @@
           <a:p>
             <a:fld id="{2BC316B3-8804-47C0-8326-0629B3A2E3D7}" type="datetimeFigureOut">
               <a:rPr lang="hu-HU" smtClean="0"/>
-              <a:t>2018.09.25.</a:t>
+              <a:t>2018.10.02.</a:t>
             </a:fld>
             <a:endParaRPr lang="hu-HU"/>
           </a:p>
@@ -427,7 +441,7 @@
           <a:p>
             <a:fld id="{2BC316B3-8804-47C0-8326-0629B3A2E3D7}" type="datetimeFigureOut">
               <a:rPr lang="hu-HU" smtClean="0"/>
-              <a:t>2018.09.25.</a:t>
+              <a:t>2018.10.02.</a:t>
             </a:fld>
             <a:endParaRPr lang="hu-HU"/>
           </a:p>
@@ -607,7 +621,7 @@
           <a:p>
             <a:fld id="{2BC316B3-8804-47C0-8326-0629B3A2E3D7}" type="datetimeFigureOut">
               <a:rPr lang="hu-HU" smtClean="0"/>
-              <a:t>2018.09.25.</a:t>
+              <a:t>2018.10.02.</a:t>
             </a:fld>
             <a:endParaRPr lang="hu-HU"/>
           </a:p>
@@ -777,7 +791,7 @@
           <a:p>
             <a:fld id="{2BC316B3-8804-47C0-8326-0629B3A2E3D7}" type="datetimeFigureOut">
               <a:rPr lang="hu-HU" smtClean="0"/>
-              <a:t>2018.09.25.</a:t>
+              <a:t>2018.10.02.</a:t>
             </a:fld>
             <a:endParaRPr lang="hu-HU"/>
           </a:p>
@@ -1023,7 +1037,7 @@
           <a:p>
             <a:fld id="{2BC316B3-8804-47C0-8326-0629B3A2E3D7}" type="datetimeFigureOut">
               <a:rPr lang="hu-HU" smtClean="0"/>
-              <a:t>2018.09.25.</a:t>
+              <a:t>2018.10.02.</a:t>
             </a:fld>
             <a:endParaRPr lang="hu-HU"/>
           </a:p>
@@ -1255,7 +1269,7 @@
           <a:p>
             <a:fld id="{2BC316B3-8804-47C0-8326-0629B3A2E3D7}" type="datetimeFigureOut">
               <a:rPr lang="hu-HU" smtClean="0"/>
-              <a:t>2018.09.25.</a:t>
+              <a:t>2018.10.02.</a:t>
             </a:fld>
             <a:endParaRPr lang="hu-HU"/>
           </a:p>
@@ -1622,7 +1636,7 @@
           <a:p>
             <a:fld id="{2BC316B3-8804-47C0-8326-0629B3A2E3D7}" type="datetimeFigureOut">
               <a:rPr lang="hu-HU" smtClean="0"/>
-              <a:t>2018.09.25.</a:t>
+              <a:t>2018.10.02.</a:t>
             </a:fld>
             <a:endParaRPr lang="hu-HU"/>
           </a:p>
@@ -1740,7 +1754,7 @@
           <a:p>
             <a:fld id="{2BC316B3-8804-47C0-8326-0629B3A2E3D7}" type="datetimeFigureOut">
               <a:rPr lang="hu-HU" smtClean="0"/>
-              <a:t>2018.09.25.</a:t>
+              <a:t>2018.10.02.</a:t>
             </a:fld>
             <a:endParaRPr lang="hu-HU"/>
           </a:p>
@@ -1835,7 +1849,7 @@
           <a:p>
             <a:fld id="{2BC316B3-8804-47C0-8326-0629B3A2E3D7}" type="datetimeFigureOut">
               <a:rPr lang="hu-HU" smtClean="0"/>
-              <a:t>2018.09.25.</a:t>
+              <a:t>2018.10.02.</a:t>
             </a:fld>
             <a:endParaRPr lang="hu-HU"/>
           </a:p>
@@ -2112,7 +2126,7 @@
           <a:p>
             <a:fld id="{2BC316B3-8804-47C0-8326-0629B3A2E3D7}" type="datetimeFigureOut">
               <a:rPr lang="hu-HU" smtClean="0"/>
-              <a:t>2018.09.25.</a:t>
+              <a:t>2018.10.02.</a:t>
             </a:fld>
             <a:endParaRPr lang="hu-HU"/>
           </a:p>
@@ -2365,7 +2379,7 @@
           <a:p>
             <a:fld id="{2BC316B3-8804-47C0-8326-0629B3A2E3D7}" type="datetimeFigureOut">
               <a:rPr lang="hu-HU" smtClean="0"/>
-              <a:t>2018.09.25.</a:t>
+              <a:t>2018.10.02.</a:t>
             </a:fld>
             <a:endParaRPr lang="hu-HU"/>
           </a:p>
@@ -2430,9 +2444,14 @@
 <p:sldMaster xmlns:a="http://schemas.openxmlformats.org/drawingml/2006/main" xmlns:r="http://schemas.openxmlformats.org/officeDocument/2006/relationships" xmlns:p="http://schemas.openxmlformats.org/presentationml/2006/main">
   <p:cSld>
     <p:bg>
-      <p:bgRef idx="1001">
-        <a:schemeClr val="bg1"/>
-      </p:bgRef>
+      <p:bgPr>
+        <a:solidFill>
+          <a:schemeClr val="bg2">
+            <a:alpha val="50000"/>
+          </a:schemeClr>
+        </a:solidFill>
+        <a:effectLst/>
+      </p:bgPr>
     </p:bg>
     <p:spTree>
       <p:nvGrpSpPr>
@@ -2578,7 +2597,7 @@
           <a:p>
             <a:fld id="{2BC316B3-8804-47C0-8326-0629B3A2E3D7}" type="datetimeFigureOut">
               <a:rPr lang="hu-HU" smtClean="0"/>
-              <a:t>2018.09.25.</a:t>
+              <a:t>2018.10.02.</a:t>
             </a:fld>
             <a:endParaRPr lang="hu-HU"/>
           </a:p>
@@ -3060,7 +3079,11 @@
           <a:p>
             <a:r>
               <a:rPr lang="hu-HU" dirty="0"/>
-              <a:t>Készítette: Nagy András</a:t>
+              <a:t>Készítette: Nagy </a:t>
+            </a:r>
+            <a:r>
+              <a:rPr lang="hu-HU" dirty="0" smtClean="0"/>
+              <a:t>András</a:t>
             </a:r>
           </a:p>
         </p:txBody>
@@ -3105,6 +3128,153 @@
             <p:ph type="title"/>
           </p:nvPr>
         </p:nvSpPr>
+        <p:spPr>
+          <a:xfrm>
+            <a:off x="838200" y="-164744"/>
+            <a:ext cx="10515600" cy="1325563"/>
+          </a:xfrm>
+        </p:spPr>
+        <p:txBody>
+          <a:bodyPr/>
+          <a:lstStyle/>
+          <a:p>
+            <a:pPr algn="ctr"/>
+            <a:r>
+              <a:rPr lang="hu-HU" dirty="0"/>
+              <a:t>Második lépcső</a:t>
+            </a:r>
+          </a:p>
+        </p:txBody>
+      </p:sp>
+      <p:sp>
+        <p:nvSpPr>
+          <p:cNvPr id="3" name="Content Placeholder 2"/>
+          <p:cNvSpPr>
+            <a:spLocks noGrp="1"/>
+          </p:cNvSpPr>
+          <p:nvPr>
+            <p:ph idx="1"/>
+          </p:nvPr>
+        </p:nvSpPr>
+        <p:spPr>
+          <a:xfrm>
+            <a:off x="706524" y="977374"/>
+            <a:ext cx="10515600" cy="4351338"/>
+          </a:xfrm>
+        </p:spPr>
+        <p:txBody>
+          <a:bodyPr>
+            <a:noAutofit/>
+          </a:bodyPr>
+          <a:lstStyle/>
+          <a:p>
+            <a:r>
+              <a:rPr lang="hu-HU" sz="3200" dirty="0"/>
+              <a:t>Nincsenek regiszterek, csak általunk elnvezett tárterületek</a:t>
+            </a:r>
+          </a:p>
+          <a:p>
+            <a:r>
+              <a:rPr lang="hu-HU" sz="3200" dirty="0"/>
+              <a:t>Értékadás: Egy általam felcimkézett tárteülernek értéket </a:t>
+            </a:r>
+            <a:r>
+              <a:rPr lang="hu-HU" sz="3200" dirty="0" smtClean="0"/>
+              <a:t>adok</a:t>
+            </a:r>
+            <a:endParaRPr lang="hu-HU" sz="3200" dirty="0"/>
+          </a:p>
+          <a:p>
+            <a:r>
+              <a:rPr lang="hu-HU" sz="3200" dirty="0"/>
+              <a:t>Elágazás: Ha valaminek az értéke ennyi, akkor csináld ezt meg azt</a:t>
+            </a:r>
+          </a:p>
+          <a:p>
+            <a:r>
+              <a:rPr lang="hu-HU" sz="3200" dirty="0"/>
+              <a:t>Ciklus: Csináld ugyanazt addig, amíg nem teljesül egy bizonyos feltétel</a:t>
+            </a:r>
+            <a:r>
+              <a:rPr lang="hu-HU" sz="3200" dirty="0" smtClean="0"/>
+              <a:t>..</a:t>
+            </a:r>
+          </a:p>
+          <a:p>
+            <a:r>
+              <a:rPr lang="hu-HU" sz="3200" dirty="0"/>
+              <a:t>Programrészeket el tudok nevezni, ezáltal újra felhasználhatóvá </a:t>
+            </a:r>
+            <a:r>
+              <a:rPr lang="hu-HU" sz="3200" dirty="0" smtClean="0"/>
+              <a:t>teszem</a:t>
+            </a:r>
+          </a:p>
+          <a:p>
+            <a:r>
+              <a:rPr lang="hu-HU" sz="3200" dirty="0" smtClean="0"/>
+              <a:t>Assemblybe </a:t>
+            </a:r>
+            <a:r>
+              <a:rPr lang="hu-HU" sz="3200" dirty="0"/>
+              <a:t>nagyon körülményes ezeket leírni, mert a </a:t>
+            </a:r>
+            <a:r>
+              <a:rPr lang="hu-HU" sz="3200" dirty="0" smtClean="0"/>
+              <a:t>csak gépi </a:t>
+            </a:r>
+            <a:r>
+              <a:rPr lang="hu-HU" sz="3200" dirty="0"/>
+              <a:t>utasításokat tudom csak használni </a:t>
+            </a:r>
+            <a:r>
+              <a:rPr lang="hu-HU" sz="3200" dirty="0" smtClean="0"/>
+              <a:t>hozzá (pl. Címkére való ugrálás, lásd következő slide)</a:t>
+            </a:r>
+            <a:endParaRPr lang="hu-HU" sz="3200" dirty="0"/>
+          </a:p>
+        </p:txBody>
+      </p:sp>
+    </p:spTree>
+    <p:extLst>
+      <p:ext uri="{BB962C8B-B14F-4D97-AF65-F5344CB8AC3E}">
+        <p14:creationId xmlns:p14="http://schemas.microsoft.com/office/powerpoint/2010/main" val="1664118026"/>
+      </p:ext>
+    </p:extLst>
+  </p:cSld>
+  <p:clrMapOvr>
+    <a:masterClrMapping/>
+  </p:clrMapOvr>
+</p:sld>
+</file>
+
+<file path=ppt/slides/slide11.xml><?xml version="1.0" encoding="utf-8"?>
+<p:sld xmlns:a="http://schemas.openxmlformats.org/drawingml/2006/main" xmlns:r="http://schemas.openxmlformats.org/officeDocument/2006/relationships" xmlns:p="http://schemas.openxmlformats.org/presentationml/2006/main">
+  <p:cSld>
+    <p:spTree>
+      <p:nvGrpSpPr>
+        <p:cNvPr id="1" name=""/>
+        <p:cNvGrpSpPr/>
+        <p:nvPr/>
+      </p:nvGrpSpPr>
+      <p:grpSpPr>
+        <a:xfrm>
+          <a:off x="0" y="0"/>
+          <a:ext cx="0" cy="0"/>
+          <a:chOff x="0" y="0"/>
+          <a:chExt cx="0" cy="0"/>
+        </a:xfrm>
+      </p:grpSpPr>
+      <p:sp>
+        <p:nvSpPr>
+          <p:cNvPr id="2" name="Title 1"/>
+          <p:cNvSpPr>
+            <a:spLocks noGrp="1"/>
+          </p:cNvSpPr>
+          <p:nvPr>
+            <p:ph type="title"/>
+          </p:nvPr>
+        </p:nvSpPr>
         <p:spPr/>
         <p:txBody>
           <a:bodyPr/>
@@ -3174,15 +3344,7 @@
             </a:r>
             <a:r>
               <a:rPr lang="hu-HU" dirty="0" smtClean="0"/>
-              <a:t>(i </a:t>
-            </a:r>
-            <a:r>
-              <a:rPr lang="hu-HU" dirty="0" smtClean="0"/>
-              <a:t>==</a:t>
-            </a:r>
-            <a:r>
-              <a:rPr lang="hu-HU" dirty="0" smtClean="0"/>
-              <a:t> 0) </a:t>
+              <a:t>(i == 0) </a:t>
             </a:r>
           </a:p>
           <a:p>
@@ -3202,7 +3364,6 @@
               <a:rPr lang="hu-HU" dirty="0"/>
               <a:t>}</a:t>
             </a:r>
-            <a:endParaRPr lang="hu-HU" dirty="0"/>
           </a:p>
           <a:p>
             <a:endParaRPr lang="hu-HU" dirty="0"/>
@@ -3249,7 +3410,6 @@
               <a:rPr lang="hu-HU" dirty="0"/>
               <a:t>{</a:t>
             </a:r>
-            <a:endParaRPr lang="hu-HU" dirty="0"/>
           </a:p>
           <a:p>
             <a:r>
@@ -3262,7 +3422,6 @@
               <a:rPr lang="hu-HU" dirty="0"/>
               <a:t>}</a:t>
             </a:r>
-            <a:endParaRPr lang="hu-HU" dirty="0"/>
           </a:p>
           <a:p>
             <a:endParaRPr lang="hu-HU" dirty="0"/>
@@ -3326,7 +3485,7 @@
         </p:nvSpPr>
         <p:spPr>
           <a:xfrm>
-            <a:off x="528625" y="2807040"/>
+            <a:off x="4911439" y="2739326"/>
             <a:ext cx="1788016" cy="369332"/>
           </a:xfrm>
           <a:prstGeom prst="rect">
@@ -3627,263 +3786,6 @@
 </p:sld>
 </file>
 
-<file path=ppt/slides/slide11.xml><?xml version="1.0" encoding="utf-8"?>
-<p:sld xmlns:a="http://schemas.openxmlformats.org/drawingml/2006/main" xmlns:r="http://schemas.openxmlformats.org/officeDocument/2006/relationships" xmlns:p="http://schemas.openxmlformats.org/presentationml/2006/main">
-  <p:cSld>
-    <p:spTree>
-      <p:nvGrpSpPr>
-        <p:cNvPr id="1" name=""/>
-        <p:cNvGrpSpPr/>
-        <p:nvPr/>
-      </p:nvGrpSpPr>
-      <p:grpSpPr>
-        <a:xfrm>
-          <a:off x="0" y="0"/>
-          <a:ext cx="0" cy="0"/>
-          <a:chOff x="0" y="0"/>
-          <a:chExt cx="0" cy="0"/>
-        </a:xfrm>
-      </p:grpSpPr>
-      <p:sp>
-        <p:nvSpPr>
-          <p:cNvPr id="2" name="Title 1"/>
-          <p:cNvSpPr>
-            <a:spLocks noGrp="1"/>
-          </p:cNvSpPr>
-          <p:nvPr>
-            <p:ph type="title"/>
-          </p:nvPr>
-        </p:nvSpPr>
-        <p:spPr>
-          <a:xfrm>
-            <a:off x="838200" y="0"/>
-            <a:ext cx="10515600" cy="1325563"/>
-          </a:xfrm>
-        </p:spPr>
-        <p:txBody>
-          <a:bodyPr/>
-          <a:lstStyle/>
-          <a:p>
-            <a:pPr algn="ctr"/>
-            <a:r>
-              <a:rPr lang="hu-HU" dirty="0" smtClean="0"/>
-              <a:t>Harmadik </a:t>
-            </a:r>
-            <a:r>
-              <a:rPr lang="hu-HU" dirty="0"/>
-              <a:t>lépcső</a:t>
-            </a:r>
-          </a:p>
-        </p:txBody>
-      </p:sp>
-      <p:sp>
-        <p:nvSpPr>
-          <p:cNvPr id="3" name="Content Placeholder 2"/>
-          <p:cNvSpPr>
-            <a:spLocks noGrp="1"/>
-          </p:cNvSpPr>
-          <p:nvPr>
-            <p:ph idx="1"/>
-          </p:nvPr>
-        </p:nvSpPr>
-        <p:spPr>
-          <a:xfrm>
-            <a:off x="992746" y="1121763"/>
-            <a:ext cx="10515600" cy="4351338"/>
-          </a:xfrm>
-        </p:spPr>
-        <p:txBody>
-          <a:bodyPr>
-            <a:normAutofit/>
-          </a:bodyPr>
-          <a:lstStyle/>
-          <a:p>
-            <a:r>
-              <a:rPr lang="hu-HU" sz="2200" dirty="0" smtClean="0"/>
-              <a:t>Saját </a:t>
-            </a:r>
-            <a:r>
-              <a:rPr lang="hu-HU" sz="2200" dirty="0"/>
-              <a:t>típusokat és típusműveleteket adhatok meg: pl: autó, mint típus, melynek egy típusművelete lehet pl az, hogy autó </a:t>
-            </a:r>
-            <a:r>
-              <a:rPr lang="hu-HU" sz="2200" dirty="0" smtClean="0"/>
-              <a:t>beindítása</a:t>
-            </a:r>
-          </a:p>
-          <a:p>
-            <a:r>
-              <a:rPr lang="hu-HU" sz="2200" dirty="0"/>
-              <a:t>Ez alatt strukturákat kell érteni (pl. Ha embereket akarunk modellezni, összefogjuk a nevét és a korát egy struktúrába, így a kódban egységesen tudjuk kezelni őket </a:t>
-            </a:r>
-            <a:r>
-              <a:rPr lang="hu-HU" sz="2200" dirty="0" smtClean="0"/>
-              <a:t>)</a:t>
-            </a:r>
-            <a:endParaRPr lang="hu-HU" sz="2200" dirty="0"/>
-          </a:p>
-          <a:p>
-            <a:r>
-              <a:rPr lang="hu-HU" sz="2200" dirty="0"/>
-              <a:t>Absztrakció: Egyre jobban ki tudom fejezni a modellezett fogalmakat a programban, pl. egy autós játékban a programkódban meg fog jelenni az autó entitás, és a játékos által vezérzet műveletek pedig meg fognak jelenni típusműveletként</a:t>
-            </a:r>
-            <a:r>
-              <a:rPr lang="hu-HU" sz="2200" dirty="0" smtClean="0"/>
-              <a:t>. (Ilyen nyelvek pl. C++, Java, C#)</a:t>
-            </a:r>
-          </a:p>
-        </p:txBody>
-      </p:sp>
-      <p:sp>
-        <p:nvSpPr>
-          <p:cNvPr id="4" name="TextBox 3"/>
-          <p:cNvSpPr txBox="1"/>
-          <p:nvPr/>
-        </p:nvSpPr>
-        <p:spPr>
-          <a:xfrm>
-            <a:off x="3236354" y="3888051"/>
-            <a:ext cx="2781836" cy="3170099"/>
-          </a:xfrm>
-          <a:prstGeom prst="rect">
-            <a:avLst/>
-          </a:prstGeom>
-          <a:noFill/>
-        </p:spPr>
-        <p:txBody>
-          <a:bodyPr wrap="square" rtlCol="0">
-            <a:spAutoFit/>
-          </a:bodyPr>
-          <a:lstStyle/>
-          <a:p>
-            <a:r>
-              <a:rPr lang="hu-HU" sz="2000" dirty="0" smtClean="0"/>
-              <a:t>class Auto {</a:t>
-            </a:r>
-          </a:p>
-          <a:p>
-            <a:r>
-              <a:rPr lang="hu-HU" sz="2000" dirty="0"/>
-              <a:t>v</a:t>
-            </a:r>
-            <a:r>
-              <a:rPr lang="hu-HU" sz="2000" dirty="0" smtClean="0"/>
-              <a:t>oid beindit() {def..}</a:t>
-            </a:r>
-          </a:p>
-          <a:p>
-            <a:endParaRPr lang="hu-HU" sz="2000" dirty="0" smtClean="0"/>
-          </a:p>
-          <a:p>
-            <a:r>
-              <a:rPr lang="hu-HU" sz="2000" dirty="0"/>
-              <a:t>e</a:t>
-            </a:r>
-            <a:r>
-              <a:rPr lang="hu-HU" sz="2000" dirty="0" smtClean="0"/>
-              <a:t>gyeb valtozok, melyek reprezentaljak az autot..</a:t>
-            </a:r>
-            <a:endParaRPr lang="hu-HU" sz="2000" dirty="0" smtClean="0"/>
-          </a:p>
-          <a:p>
-            <a:r>
-              <a:rPr lang="hu-HU" sz="2000" dirty="0" smtClean="0"/>
-              <a:t>};</a:t>
-            </a:r>
-          </a:p>
-          <a:p>
-            <a:endParaRPr lang="hu-HU" sz="2000" dirty="0"/>
-          </a:p>
-          <a:p>
-            <a:r>
-              <a:rPr lang="hu-HU" sz="2000" dirty="0" smtClean="0"/>
-              <a:t>Auto </a:t>
-            </a:r>
-            <a:r>
-              <a:rPr lang="hu-HU" sz="2000" dirty="0"/>
-              <a:t>auto(‚Ford’);</a:t>
-            </a:r>
-          </a:p>
-          <a:p>
-            <a:r>
-              <a:rPr lang="hu-HU" sz="2000" dirty="0"/>
-              <a:t>auto.beindit</a:t>
-            </a:r>
-            <a:r>
-              <a:rPr lang="hu-HU" sz="2000" dirty="0" smtClean="0"/>
-              <a:t>();</a:t>
-            </a:r>
-          </a:p>
-          <a:p>
-            <a:endParaRPr lang="hu-HU" sz="2000" dirty="0"/>
-          </a:p>
-        </p:txBody>
-      </p:sp>
-      <p:sp>
-        <p:nvSpPr>
-          <p:cNvPr id="5" name="TextBox 4"/>
-          <p:cNvSpPr txBox="1"/>
-          <p:nvPr/>
-        </p:nvSpPr>
-        <p:spPr>
-          <a:xfrm>
-            <a:off x="1171977" y="4601711"/>
-            <a:ext cx="2137894" cy="1200329"/>
-          </a:xfrm>
-          <a:prstGeom prst="rect">
-            <a:avLst/>
-          </a:prstGeom>
-          <a:noFill/>
-        </p:spPr>
-        <p:txBody>
-          <a:bodyPr wrap="square" rtlCol="0">
-            <a:spAutoFit/>
-          </a:bodyPr>
-          <a:lstStyle/>
-          <a:p>
-            <a:r>
-              <a:rPr lang="hu-HU" dirty="0"/>
-              <a:t>s</a:t>
-            </a:r>
-            <a:r>
-              <a:rPr lang="hu-HU" dirty="0" smtClean="0"/>
-              <a:t>truct Ember {</a:t>
-            </a:r>
-          </a:p>
-          <a:p>
-            <a:r>
-              <a:rPr lang="hu-HU" dirty="0" smtClean="0"/>
-              <a:t>String nev;</a:t>
-            </a:r>
-          </a:p>
-          <a:p>
-            <a:r>
-              <a:rPr lang="hu-HU" dirty="0" smtClean="0"/>
-              <a:t>Int kor;</a:t>
-            </a:r>
-          </a:p>
-          <a:p>
-            <a:r>
-              <a:rPr lang="hu-HU" dirty="0" smtClean="0"/>
-              <a:t>};</a:t>
-            </a:r>
-            <a:endParaRPr lang="hu-HU" dirty="0"/>
-          </a:p>
-        </p:txBody>
-      </p:sp>
-    </p:spTree>
-    <p:extLst>
-      <p:ext uri="{BB962C8B-B14F-4D97-AF65-F5344CB8AC3E}">
-        <p14:creationId xmlns:p14="http://schemas.microsoft.com/office/powerpoint/2010/main" val="3169758263"/>
-      </p:ext>
-    </p:extLst>
-  </p:cSld>
-  <p:clrMapOvr>
-    <a:masterClrMapping/>
-  </p:clrMapOvr>
-</p:sld>
-</file>
-
 <file path=ppt/slides/slide12.xml><?xml version="1.0" encoding="utf-8"?>
 <p:sld xmlns:a="http://schemas.openxmlformats.org/drawingml/2006/main" xmlns:r="http://schemas.openxmlformats.org/officeDocument/2006/relationships" xmlns:p="http://schemas.openxmlformats.org/presentationml/2006/main">
   <p:cSld>
@@ -3913,6 +3815,270 @@
         </p:nvSpPr>
         <p:spPr>
           <a:xfrm>
+            <a:off x="838200" y="0"/>
+            <a:ext cx="10515600" cy="1325563"/>
+          </a:xfrm>
+        </p:spPr>
+        <p:txBody>
+          <a:bodyPr/>
+          <a:lstStyle/>
+          <a:p>
+            <a:pPr algn="ctr"/>
+            <a:r>
+              <a:rPr lang="hu-HU" dirty="0" smtClean="0"/>
+              <a:t>Harmadik </a:t>
+            </a:r>
+            <a:r>
+              <a:rPr lang="hu-HU" dirty="0"/>
+              <a:t>lépcső</a:t>
+            </a:r>
+          </a:p>
+        </p:txBody>
+      </p:sp>
+      <p:sp>
+        <p:nvSpPr>
+          <p:cNvPr id="3" name="Content Placeholder 2"/>
+          <p:cNvSpPr>
+            <a:spLocks noGrp="1"/>
+          </p:cNvSpPr>
+          <p:nvPr>
+            <p:ph idx="1"/>
+          </p:nvPr>
+        </p:nvSpPr>
+        <p:spPr>
+          <a:xfrm>
+            <a:off x="992746" y="1121763"/>
+            <a:ext cx="10515600" cy="4351338"/>
+          </a:xfrm>
+        </p:spPr>
+        <p:txBody>
+          <a:bodyPr>
+            <a:normAutofit/>
+          </a:bodyPr>
+          <a:lstStyle/>
+          <a:p>
+            <a:r>
+              <a:rPr lang="hu-HU" sz="2200" dirty="0" smtClean="0"/>
+              <a:t>Saját </a:t>
+            </a:r>
+            <a:r>
+              <a:rPr lang="hu-HU" sz="2200" dirty="0"/>
+              <a:t>típusokat és típusműveleteket adhatok meg: pl: autó, mint típus, melynek egy típusművelete lehet pl az, hogy autó </a:t>
+            </a:r>
+            <a:r>
+              <a:rPr lang="hu-HU" sz="2200" dirty="0" smtClean="0"/>
+              <a:t>beindítása</a:t>
+            </a:r>
+          </a:p>
+          <a:p>
+            <a:r>
+              <a:rPr lang="hu-HU" sz="2200" dirty="0"/>
+              <a:t>Ez alatt strukturákat kell érteni (pl. </a:t>
+            </a:r>
+            <a:r>
+              <a:rPr lang="hu-HU" sz="2200" dirty="0" smtClean="0"/>
+              <a:t>Ha emberek adatait szeretnék tárolni összefogjuk egy struktúrába</a:t>
+            </a:r>
+            <a:r>
+              <a:rPr lang="hu-HU" sz="2200" dirty="0"/>
+              <a:t>, így a kódban egységesen tudjuk kezelni őket </a:t>
+            </a:r>
+            <a:r>
+              <a:rPr lang="hu-HU" sz="2200" dirty="0" smtClean="0"/>
+              <a:t>)</a:t>
+            </a:r>
+            <a:endParaRPr lang="hu-HU" sz="2200" dirty="0"/>
+          </a:p>
+          <a:p>
+            <a:r>
+              <a:rPr lang="hu-HU" sz="2200" dirty="0"/>
+              <a:t>Absztrakció: Egyre jobban ki tudom fejezni a modellezett fogalmakat a programban, pl. egy autós játékban a programkódban meg fog jelenni az autó entitás, és a játékos által vezérzet műveletek pedig meg fognak jelenni típusműveletként</a:t>
+            </a:r>
+            <a:r>
+              <a:rPr lang="hu-HU" sz="2200" dirty="0" smtClean="0"/>
+              <a:t>. (Ilyen nyelvek pl. C++, Java, C#)</a:t>
+            </a:r>
+          </a:p>
+        </p:txBody>
+      </p:sp>
+      <p:sp>
+        <p:nvSpPr>
+          <p:cNvPr id="4" name="TextBox 3"/>
+          <p:cNvSpPr txBox="1"/>
+          <p:nvPr/>
+        </p:nvSpPr>
+        <p:spPr>
+          <a:xfrm>
+            <a:off x="6752065" y="3687901"/>
+            <a:ext cx="2781836" cy="3170099"/>
+          </a:xfrm>
+          <a:prstGeom prst="rect">
+            <a:avLst/>
+          </a:prstGeom>
+          <a:noFill/>
+        </p:spPr>
+        <p:txBody>
+          <a:bodyPr wrap="square" rtlCol="0">
+            <a:spAutoFit/>
+          </a:bodyPr>
+          <a:lstStyle/>
+          <a:p>
+            <a:r>
+              <a:rPr lang="hu-HU" sz="2000" dirty="0" smtClean="0"/>
+              <a:t>class Auto {</a:t>
+            </a:r>
+          </a:p>
+          <a:p>
+            <a:r>
+              <a:rPr lang="hu-HU" sz="2000" dirty="0"/>
+              <a:t>v</a:t>
+            </a:r>
+            <a:r>
+              <a:rPr lang="hu-HU" sz="2000" dirty="0" smtClean="0"/>
+              <a:t>oid beindit() {def..}</a:t>
+            </a:r>
+          </a:p>
+          <a:p>
+            <a:endParaRPr lang="hu-HU" sz="2000" dirty="0" smtClean="0"/>
+          </a:p>
+          <a:p>
+            <a:r>
+              <a:rPr lang="hu-HU" sz="2000" dirty="0"/>
+              <a:t>e</a:t>
+            </a:r>
+            <a:r>
+              <a:rPr lang="hu-HU" sz="2000" dirty="0" smtClean="0"/>
+              <a:t>gyeb valtozok, melyek reprezentaljak az autot..</a:t>
+            </a:r>
+          </a:p>
+          <a:p>
+            <a:r>
+              <a:rPr lang="hu-HU" sz="2000" dirty="0" smtClean="0"/>
+              <a:t>};</a:t>
+            </a:r>
+          </a:p>
+          <a:p>
+            <a:endParaRPr lang="hu-HU" sz="2000" dirty="0"/>
+          </a:p>
+          <a:p>
+            <a:r>
+              <a:rPr lang="hu-HU" sz="2000" dirty="0" smtClean="0"/>
+              <a:t>Auto </a:t>
+            </a:r>
+            <a:r>
+              <a:rPr lang="hu-HU" sz="2000" dirty="0"/>
+              <a:t>auto(‚Ford’);</a:t>
+            </a:r>
+          </a:p>
+          <a:p>
+            <a:r>
+              <a:rPr lang="hu-HU" sz="2000" dirty="0"/>
+              <a:t>auto.beindit</a:t>
+            </a:r>
+            <a:r>
+              <a:rPr lang="hu-HU" sz="2000" dirty="0" smtClean="0"/>
+              <a:t>();</a:t>
+            </a:r>
+          </a:p>
+          <a:p>
+            <a:endParaRPr lang="hu-HU" sz="2000" dirty="0"/>
+          </a:p>
+        </p:txBody>
+      </p:sp>
+      <p:sp>
+        <p:nvSpPr>
+          <p:cNvPr id="5" name="TextBox 4"/>
+          <p:cNvSpPr txBox="1"/>
+          <p:nvPr/>
+        </p:nvSpPr>
+        <p:spPr>
+          <a:xfrm>
+            <a:off x="1171977" y="4601711"/>
+            <a:ext cx="2137894" cy="1200329"/>
+          </a:xfrm>
+          <a:prstGeom prst="rect">
+            <a:avLst/>
+          </a:prstGeom>
+          <a:noFill/>
+        </p:spPr>
+        <p:txBody>
+          <a:bodyPr wrap="square" rtlCol="0">
+            <a:spAutoFit/>
+          </a:bodyPr>
+          <a:lstStyle/>
+          <a:p>
+            <a:r>
+              <a:rPr lang="hu-HU" dirty="0"/>
+              <a:t>s</a:t>
+            </a:r>
+            <a:r>
+              <a:rPr lang="hu-HU" dirty="0" smtClean="0"/>
+              <a:t>truct Ember {</a:t>
+            </a:r>
+          </a:p>
+          <a:p>
+            <a:r>
+              <a:rPr lang="hu-HU" dirty="0" smtClean="0"/>
+              <a:t>String nev;</a:t>
+            </a:r>
+          </a:p>
+          <a:p>
+            <a:r>
+              <a:rPr lang="hu-HU" dirty="0" smtClean="0"/>
+              <a:t>Int kor;</a:t>
+            </a:r>
+          </a:p>
+          <a:p>
+            <a:r>
+              <a:rPr lang="hu-HU" dirty="0" smtClean="0"/>
+              <a:t>};</a:t>
+            </a:r>
+            <a:endParaRPr lang="hu-HU" dirty="0"/>
+          </a:p>
+        </p:txBody>
+      </p:sp>
+    </p:spTree>
+    <p:extLst>
+      <p:ext uri="{BB962C8B-B14F-4D97-AF65-F5344CB8AC3E}">
+        <p14:creationId xmlns:p14="http://schemas.microsoft.com/office/powerpoint/2010/main" val="3169758263"/>
+      </p:ext>
+    </p:extLst>
+  </p:cSld>
+  <p:clrMapOvr>
+    <a:masterClrMapping/>
+  </p:clrMapOvr>
+</p:sld>
+</file>
+
+<file path=ppt/slides/slide13.xml><?xml version="1.0" encoding="utf-8"?>
+<p:sld xmlns:a="http://schemas.openxmlformats.org/drawingml/2006/main" xmlns:r="http://schemas.openxmlformats.org/officeDocument/2006/relationships" xmlns:p="http://schemas.openxmlformats.org/presentationml/2006/main">
+  <p:cSld>
+    <p:spTree>
+      <p:nvGrpSpPr>
+        <p:cNvPr id="1" name=""/>
+        <p:cNvGrpSpPr/>
+        <p:nvPr/>
+      </p:nvGrpSpPr>
+      <p:grpSpPr>
+        <a:xfrm>
+          <a:off x="0" y="0"/>
+          <a:ext cx="0" cy="0"/>
+          <a:chOff x="0" y="0"/>
+          <a:chExt cx="0" cy="0"/>
+        </a:xfrm>
+      </p:grpSpPr>
+      <p:sp>
+        <p:nvSpPr>
+          <p:cNvPr id="2" name="Title 1"/>
+          <p:cNvSpPr>
+            <a:spLocks noGrp="1"/>
+          </p:cNvSpPr>
+          <p:nvPr>
+            <p:ph type="title"/>
+          </p:nvPr>
+        </p:nvSpPr>
+        <p:spPr>
+          <a:xfrm>
             <a:off x="838200" y="193182"/>
             <a:ext cx="10515600" cy="1325563"/>
           </a:xfrm>
@@ -3988,7 +4154,15 @@
           <a:p>
             <a:r>
               <a:rPr lang="hu-HU" dirty="0" smtClean="0"/>
-              <a:t>A tervező készít egy grafikus rajzot a program várázól, a kivitelező, kódóló pedig az alapján fog dolgozni..</a:t>
+              <a:t>A tervező készít egy grafikus rajzot a program várázól, a kivitelező, </a:t>
+            </a:r>
+            <a:r>
+              <a:rPr lang="hu-HU" dirty="0" smtClean="0"/>
+              <a:t>kódoló </a:t>
+            </a:r>
+            <a:r>
+              <a:rPr lang="hu-HU" dirty="0" smtClean="0"/>
+              <a:t>pedig az alapján fog dolgozni..</a:t>
             </a:r>
           </a:p>
           <a:p>
@@ -4001,7 +4175,11 @@
           <a:p>
             <a:r>
               <a:rPr lang="hu-HU" dirty="0" smtClean="0"/>
-              <a:t>Ezen a szinten nem foglalkozunk programozási nyelvekkel, kódokkal, ezeket elhanyagoljunk, a lényeg a modellezet fogalmakon van</a:t>
+              <a:t>Ezen a szinten nem foglalkozunk programozási nyelvekkel, kódokkal, ezeket elhanyagoljunk, a lényeg a modellezet fogalmakon </a:t>
+            </a:r>
+            <a:r>
+              <a:rPr lang="hu-HU" dirty="0" smtClean="0"/>
+              <a:t>van (pl. Az auton)</a:t>
             </a:r>
             <a:endParaRPr lang="hu-HU" dirty="0"/>
           </a:p>
@@ -4023,7 +4201,7 @@
 </p:sld>
 </file>
 
-<file path=ppt/slides/slide13.xml><?xml version="1.0" encoding="utf-8"?>
+<file path=ppt/slides/slide14.xml><?xml version="1.0" encoding="utf-8"?>
 <p:sld xmlns:a="http://schemas.openxmlformats.org/drawingml/2006/main" xmlns:r="http://schemas.openxmlformats.org/officeDocument/2006/relationships" xmlns:p="http://schemas.openxmlformats.org/presentationml/2006/main">
   <p:cSld>
     <p:spTree>
@@ -4208,142 +4386,6 @@
 </p:sld>
 </file>
 
-<file path=ppt/slides/slide14.xml><?xml version="1.0" encoding="utf-8"?>
-<p:sld xmlns:a="http://schemas.openxmlformats.org/drawingml/2006/main" xmlns:r="http://schemas.openxmlformats.org/officeDocument/2006/relationships" xmlns:p="http://schemas.openxmlformats.org/presentationml/2006/main">
-  <p:cSld>
-    <p:spTree>
-      <p:nvGrpSpPr>
-        <p:cNvPr id="1" name=""/>
-        <p:cNvGrpSpPr/>
-        <p:nvPr/>
-      </p:nvGrpSpPr>
-      <p:grpSpPr>
-        <a:xfrm>
-          <a:off x="0" y="0"/>
-          <a:ext cx="0" cy="0"/>
-          <a:chOff x="0" y="0"/>
-          <a:chExt cx="0" cy="0"/>
-        </a:xfrm>
-      </p:grpSpPr>
-      <p:sp>
-        <p:nvSpPr>
-          <p:cNvPr id="2" name="Title 1"/>
-          <p:cNvSpPr>
-            <a:spLocks noGrp="1"/>
-          </p:cNvSpPr>
-          <p:nvPr>
-            <p:ph type="title"/>
-          </p:nvPr>
-        </p:nvSpPr>
-        <p:spPr/>
-        <p:txBody>
-          <a:bodyPr/>
-          <a:lstStyle/>
-          <a:p>
-            <a:pPr algn="ctr"/>
-            <a:r>
-              <a:rPr lang="hu-HU" dirty="0" smtClean="0"/>
-              <a:t>Végrehajtható terv</a:t>
-            </a:r>
-            <a:endParaRPr lang="hu-HU" dirty="0"/>
-          </a:p>
-        </p:txBody>
-      </p:sp>
-      <p:sp>
-        <p:nvSpPr>
-          <p:cNvPr id="3" name="Content Placeholder 2"/>
-          <p:cNvSpPr>
-            <a:spLocks noGrp="1"/>
-          </p:cNvSpPr>
-          <p:nvPr>
-            <p:ph idx="1"/>
-          </p:nvPr>
-        </p:nvSpPr>
-        <p:spPr>
-          <a:xfrm>
-            <a:off x="838200" y="1825625"/>
-            <a:ext cx="10515600" cy="4794116"/>
-          </a:xfrm>
-        </p:spPr>
-        <p:txBody>
-          <a:bodyPr/>
-          <a:lstStyle/>
-          <a:p>
-            <a:r>
-              <a:rPr lang="hu-HU" dirty="0" smtClean="0"/>
-              <a:t>Egy jól definiált leíró nyelvvel azonban a tervet végre tudjuk hajtani, teszteni tudjuk</a:t>
-            </a:r>
-          </a:p>
-          <a:p>
-            <a:r>
-              <a:rPr lang="hu-HU" dirty="0" smtClean="0"/>
-              <a:t>Hogyan?</a:t>
-            </a:r>
-          </a:p>
-          <a:p>
-            <a:r>
-              <a:rPr lang="hu-HU" dirty="0" smtClean="0"/>
-              <a:t>Hát egy programmal! </a:t>
-            </a:r>
-            <a:r>
-              <a:rPr lang="hu-HU" dirty="0" smtClean="0">
-                <a:sym typeface="Wingdings" panose="05000000000000000000" pitchFamily="2" charset="2"/>
-              </a:rPr>
-              <a:t> Általánosságban két lehetőségünk van rá.</a:t>
-            </a:r>
-          </a:p>
-          <a:p>
-            <a:pPr marL="914400" lvl="1" indent="-457200">
-              <a:buFont typeface="+mj-lt"/>
-              <a:buAutoNum type="arabicPeriod"/>
-            </a:pPr>
-            <a:r>
-              <a:rPr lang="hu-HU" dirty="0" smtClean="0">
-                <a:sym typeface="Wingdings" panose="05000000000000000000" pitchFamily="2" charset="2"/>
-              </a:rPr>
-              <a:t>Lefordítjuk a tervet egy megfelelő célnyelvre, pl c++-ra. (lényegében ez is egy fordítóprogram)</a:t>
-            </a:r>
-          </a:p>
-          <a:p>
-            <a:pPr marL="914400" lvl="1" indent="-457200">
-              <a:buFont typeface="+mj-lt"/>
-              <a:buAutoNum type="arabicPeriod"/>
-            </a:pPr>
-            <a:r>
-              <a:rPr lang="hu-HU" dirty="0">
-                <a:sym typeface="Wingdings" panose="05000000000000000000" pitchFamily="2" charset="2"/>
-              </a:rPr>
-              <a:t>Í</a:t>
-            </a:r>
-            <a:r>
-              <a:rPr lang="hu-HU" dirty="0" smtClean="0">
-                <a:sym typeface="Wingdings" panose="05000000000000000000" pitchFamily="2" charset="2"/>
-              </a:rPr>
-              <a:t>runk egy saját „virtuális gépet” (egy végrehajtó programot), melynek a nyelve nem bináris kód, hanem a tervben szereplő leíróelemek</a:t>
-            </a:r>
-          </a:p>
-          <a:p>
-            <a:r>
-              <a:rPr lang="hu-HU" dirty="0" smtClean="0"/>
-              <a:t>Kutatási terület, nem kiforrott..</a:t>
-            </a:r>
-            <a:endParaRPr lang="hu-HU" dirty="0"/>
-          </a:p>
-        </p:txBody>
-      </p:sp>
-    </p:spTree>
-    <p:extLst>
-      <p:ext uri="{BB962C8B-B14F-4D97-AF65-F5344CB8AC3E}">
-        <p14:creationId xmlns:p14="http://schemas.microsoft.com/office/powerpoint/2010/main" val="3042284824"/>
-      </p:ext>
-    </p:extLst>
-  </p:cSld>
-  <p:clrMapOvr>
-    <a:masterClrMapping/>
-  </p:clrMapOvr>
-</p:sld>
-</file>
-
 <file path=ppt/slides/slide15.xml><?xml version="1.0" encoding="utf-8"?>
 <p:sld xmlns:a="http://schemas.openxmlformats.org/drawingml/2006/main" xmlns:r="http://schemas.openxmlformats.org/officeDocument/2006/relationships" xmlns:p="http://schemas.openxmlformats.org/presentationml/2006/main">
   <p:cSld>
@@ -4379,6 +4421,150 @@
             <a:pPr algn="ctr"/>
             <a:r>
               <a:rPr lang="hu-HU" dirty="0" smtClean="0"/>
+              <a:t>Végrehajtható terv</a:t>
+            </a:r>
+            <a:endParaRPr lang="hu-HU" dirty="0"/>
+          </a:p>
+        </p:txBody>
+      </p:sp>
+      <p:sp>
+        <p:nvSpPr>
+          <p:cNvPr id="3" name="Content Placeholder 2"/>
+          <p:cNvSpPr>
+            <a:spLocks noGrp="1"/>
+          </p:cNvSpPr>
+          <p:nvPr>
+            <p:ph idx="1"/>
+          </p:nvPr>
+        </p:nvSpPr>
+        <p:spPr>
+          <a:xfrm>
+            <a:off x="838200" y="1825625"/>
+            <a:ext cx="10515600" cy="4794116"/>
+          </a:xfrm>
+        </p:spPr>
+        <p:txBody>
+          <a:bodyPr/>
+          <a:lstStyle/>
+          <a:p>
+            <a:r>
+              <a:rPr lang="hu-HU" dirty="0" smtClean="0"/>
+              <a:t>Egy jól definiált leíró nyelvvel azonban a tervet végre tudjuk hajtani, </a:t>
+            </a:r>
+            <a:r>
+              <a:rPr lang="hu-HU" dirty="0" smtClean="0"/>
+              <a:t>tesztelni </a:t>
+            </a:r>
+            <a:r>
+              <a:rPr lang="hu-HU" dirty="0" smtClean="0"/>
+              <a:t>tudjuk</a:t>
+            </a:r>
+          </a:p>
+          <a:p>
+            <a:r>
+              <a:rPr lang="hu-HU" dirty="0" smtClean="0"/>
+              <a:t>Hogyan?</a:t>
+            </a:r>
+          </a:p>
+          <a:p>
+            <a:r>
+              <a:rPr lang="hu-HU" dirty="0" smtClean="0"/>
+              <a:t>Hát egy programmal! </a:t>
+            </a:r>
+            <a:r>
+              <a:rPr lang="hu-HU" dirty="0" smtClean="0">
+                <a:sym typeface="Wingdings" panose="05000000000000000000" pitchFamily="2" charset="2"/>
+              </a:rPr>
+              <a:t> Általánosságban két lehetőségünk van rá.</a:t>
+            </a:r>
+          </a:p>
+          <a:p>
+            <a:pPr marL="914400" lvl="1" indent="-457200">
+              <a:buFont typeface="+mj-lt"/>
+              <a:buAutoNum type="arabicPeriod"/>
+            </a:pPr>
+            <a:r>
+              <a:rPr lang="hu-HU" dirty="0" smtClean="0">
+                <a:sym typeface="Wingdings" panose="05000000000000000000" pitchFamily="2" charset="2"/>
+              </a:rPr>
+              <a:t>Lefordítjuk a tervet egy megfelelő célnyelvre, pl c++-ra. (lényegében ez is egy fordítóprogram)</a:t>
+            </a:r>
+          </a:p>
+          <a:p>
+            <a:pPr marL="914400" lvl="1" indent="-457200">
+              <a:buFont typeface="+mj-lt"/>
+              <a:buAutoNum type="arabicPeriod"/>
+            </a:pPr>
+            <a:r>
+              <a:rPr lang="hu-HU" dirty="0">
+                <a:sym typeface="Wingdings" panose="05000000000000000000" pitchFamily="2" charset="2"/>
+              </a:rPr>
+              <a:t>Í</a:t>
+            </a:r>
+            <a:r>
+              <a:rPr lang="hu-HU" dirty="0" smtClean="0">
+                <a:sym typeface="Wingdings" panose="05000000000000000000" pitchFamily="2" charset="2"/>
+              </a:rPr>
+              <a:t>runk egy saját „virtuális gépet” (egy végrehajtó programot), melynek a nyelve nem bináris kód, hanem a tervben szereplő leíróelemek</a:t>
+            </a:r>
+          </a:p>
+          <a:p>
+            <a:r>
+              <a:rPr lang="hu-HU" dirty="0" smtClean="0"/>
+              <a:t>Kutatási terület, nem kiforrott..</a:t>
+            </a:r>
+            <a:endParaRPr lang="hu-HU" dirty="0"/>
+          </a:p>
+        </p:txBody>
+      </p:sp>
+    </p:spTree>
+    <p:extLst>
+      <p:ext uri="{BB962C8B-B14F-4D97-AF65-F5344CB8AC3E}">
+        <p14:creationId xmlns:p14="http://schemas.microsoft.com/office/powerpoint/2010/main" val="3042284824"/>
+      </p:ext>
+    </p:extLst>
+  </p:cSld>
+  <p:clrMapOvr>
+    <a:masterClrMapping/>
+  </p:clrMapOvr>
+</p:sld>
+</file>
+
+<file path=ppt/slides/slide16.xml><?xml version="1.0" encoding="utf-8"?>
+<p:sld xmlns:a="http://schemas.openxmlformats.org/drawingml/2006/main" xmlns:r="http://schemas.openxmlformats.org/officeDocument/2006/relationships" xmlns:p="http://schemas.openxmlformats.org/presentationml/2006/main">
+  <p:cSld>
+    <p:spTree>
+      <p:nvGrpSpPr>
+        <p:cNvPr id="1" name=""/>
+        <p:cNvGrpSpPr/>
+        <p:nvPr/>
+      </p:nvGrpSpPr>
+      <p:grpSpPr>
+        <a:xfrm>
+          <a:off x="0" y="0"/>
+          <a:ext cx="0" cy="0"/>
+          <a:chOff x="0" y="0"/>
+          <a:chExt cx="0" cy="0"/>
+        </a:xfrm>
+      </p:grpSpPr>
+      <p:sp>
+        <p:nvSpPr>
+          <p:cNvPr id="2" name="Title 1"/>
+          <p:cNvSpPr>
+            <a:spLocks noGrp="1"/>
+          </p:cNvSpPr>
+          <p:nvPr>
+            <p:ph type="title"/>
+          </p:nvPr>
+        </p:nvSpPr>
+        <p:spPr/>
+        <p:txBody>
+          <a:bodyPr/>
+          <a:lstStyle/>
+          <a:p>
+            <a:pPr algn="ctr"/>
+            <a:r>
+              <a:rPr lang="hu-HU" dirty="0" smtClean="0"/>
               <a:t>Zárógondolat</a:t>
             </a:r>
             <a:endParaRPr lang="hu-HU" dirty="0"/>
@@ -4397,7 +4583,9 @@
         </p:nvSpPr>
         <p:spPr/>
         <p:txBody>
-          <a:bodyPr/>
+          <a:bodyPr>
+            <a:normAutofit lnSpcReduction="10000"/>
+          </a:bodyPr>
           <a:lstStyle/>
           <a:p>
             <a:r>
@@ -4434,13 +4622,22 @@
           <a:p>
             <a:r>
               <a:rPr lang="hu-HU" dirty="0" smtClean="0"/>
-              <a:t>A nyelvnek nem muszáj általános célú nyelvnek lennie (Nem biztos, hogy mindent ki tudok fejezni vele)</a:t>
-            </a:r>
-          </a:p>
-          <a:p>
+              <a:t>A nyelvnek nem muszáj általános célú nyelvnek lennie (Nem biztos, hogy mindent ki tudok fejezni </a:t>
+            </a:r>
             <a:r>
               <a:rPr lang="hu-HU" dirty="0" smtClean="0"/>
-              <a:t>ELTÉ-n lehet tanulni fordítóprogramokról..</a:t>
+              <a:t>vele, pl. Lehet egy robot irányítása tervezem, fel, le, jobbra, blra utasításokkal)</a:t>
+            </a:r>
+            <a:endParaRPr lang="hu-HU" dirty="0" smtClean="0"/>
+          </a:p>
+          <a:p>
+            <a:r>
+              <a:rPr lang="hu-HU" dirty="0" smtClean="0"/>
+              <a:t>ELTÉ-n lehet tanulni fordítóprogramokról</a:t>
+            </a:r>
+            <a:r>
+              <a:rPr lang="hu-HU" dirty="0" smtClean="0"/>
+              <a:t>..</a:t>
             </a:r>
             <a:endParaRPr lang="hu-HU" dirty="0"/>
           </a:p>
@@ -4450,6 +4647,148 @@
     <p:extLst>
       <p:ext uri="{BB962C8B-B14F-4D97-AF65-F5344CB8AC3E}">
         <p14:creationId xmlns:p14="http://schemas.microsoft.com/office/powerpoint/2010/main" val="684149777"/>
+      </p:ext>
+    </p:extLst>
+  </p:cSld>
+  <p:clrMapOvr>
+    <a:masterClrMapping/>
+  </p:clrMapOvr>
+</p:sld>
+</file>
+
+<file path=ppt/slides/slide17.xml><?xml version="1.0" encoding="utf-8"?>
+<p:sld xmlns:a="http://schemas.openxmlformats.org/drawingml/2006/main" xmlns:r="http://schemas.openxmlformats.org/officeDocument/2006/relationships" xmlns:p="http://schemas.openxmlformats.org/presentationml/2006/main">
+  <p:cSld>
+    <p:spTree>
+      <p:nvGrpSpPr>
+        <p:cNvPr id="1" name=""/>
+        <p:cNvGrpSpPr/>
+        <p:nvPr/>
+      </p:nvGrpSpPr>
+      <p:grpSpPr>
+        <a:xfrm>
+          <a:off x="0" y="0"/>
+          <a:ext cx="0" cy="0"/>
+          <a:chOff x="0" y="0"/>
+          <a:chExt cx="0" cy="0"/>
+        </a:xfrm>
+      </p:grpSpPr>
+      <p:sp>
+        <p:nvSpPr>
+          <p:cNvPr id="2" name="Title 1"/>
+          <p:cNvSpPr>
+            <a:spLocks noGrp="1"/>
+          </p:cNvSpPr>
+          <p:nvPr>
+            <p:ph type="title"/>
+          </p:nvPr>
+        </p:nvSpPr>
+        <p:spPr>
+          <a:xfrm>
+            <a:off x="838200" y="885387"/>
+            <a:ext cx="10515600" cy="1325563"/>
+          </a:xfrm>
+        </p:spPr>
+        <p:txBody>
+          <a:bodyPr>
+            <a:normAutofit/>
+          </a:bodyPr>
+          <a:lstStyle/>
+          <a:p>
+            <a:pPr algn="ctr"/>
+            <a:r>
+              <a:rPr lang="hu-HU" sz="6600" dirty="0" smtClean="0"/>
+              <a:t>Köszönöm a figyelmet!</a:t>
+            </a:r>
+            <a:endParaRPr lang="hu-HU" sz="6600" dirty="0"/>
+          </a:p>
+        </p:txBody>
+      </p:sp>
+      <p:sp>
+        <p:nvSpPr>
+          <p:cNvPr id="3" name="Content Placeholder 2"/>
+          <p:cNvSpPr>
+            <a:spLocks noGrp="1"/>
+          </p:cNvSpPr>
+          <p:nvPr>
+            <p:ph idx="1"/>
+          </p:nvPr>
+        </p:nvSpPr>
+        <p:spPr>
+          <a:xfrm>
+            <a:off x="838200" y="2393184"/>
+            <a:ext cx="10515600" cy="665326"/>
+          </a:xfrm>
+        </p:spPr>
+        <p:txBody>
+          <a:bodyPr>
+            <a:normAutofit/>
+          </a:bodyPr>
+          <a:lstStyle/>
+          <a:p>
+            <a:pPr marL="0" indent="0" algn="ctr">
+              <a:buNone/>
+            </a:pPr>
+            <a:r>
+              <a:rPr lang="hu-HU" sz="4000" dirty="0" smtClean="0"/>
+              <a:t>Kérdések..</a:t>
+            </a:r>
+          </a:p>
+        </p:txBody>
+      </p:sp>
+      <p:sp>
+        <p:nvSpPr>
+          <p:cNvPr id="4" name="TextBox 3"/>
+          <p:cNvSpPr txBox="1"/>
+          <p:nvPr/>
+        </p:nvSpPr>
+        <p:spPr>
+          <a:xfrm>
+            <a:off x="173420" y="5470635"/>
+            <a:ext cx="4351284" cy="1138773"/>
+          </a:xfrm>
+          <a:prstGeom prst="rect">
+            <a:avLst/>
+          </a:prstGeom>
+          <a:noFill/>
+        </p:spPr>
+        <p:txBody>
+          <a:bodyPr wrap="square" rtlCol="0">
+            <a:spAutoFit/>
+          </a:bodyPr>
+          <a:lstStyle/>
+          <a:p>
+            <a:r>
+              <a:rPr lang="hu-HU" sz="2800" dirty="0" smtClean="0"/>
+              <a:t>Elérhetőség: </a:t>
+            </a:r>
+          </a:p>
+          <a:p>
+            <a:r>
+              <a:rPr lang="hu-HU" sz="2000" dirty="0" smtClean="0"/>
+              <a:t>email: </a:t>
+            </a:r>
+            <a:r>
+              <a:rPr lang="hu-HU" sz="2000" i="1" dirty="0" smtClean="0">
+                <a:hlinkClick r:id="rId2"/>
+              </a:rPr>
+              <a:t>nagy.andras95@gmail.com</a:t>
+            </a:r>
+            <a:endParaRPr lang="hu-HU" sz="2000" i="1" dirty="0" smtClean="0"/>
+          </a:p>
+          <a:p>
+            <a:r>
+              <a:rPr lang="hu-HU" sz="2000" dirty="0" smtClean="0"/>
+              <a:t>Finna Imola tanárnőn keresztül..</a:t>
+            </a:r>
+            <a:endParaRPr lang="hu-HU" sz="2000" dirty="0"/>
+          </a:p>
+        </p:txBody>
+      </p:sp>
+    </p:spTree>
+    <p:extLst>
+      <p:ext uri="{BB962C8B-B14F-4D97-AF65-F5344CB8AC3E}">
+        <p14:creationId xmlns:p14="http://schemas.microsoft.com/office/powerpoint/2010/main" val="1594562261"/>
       </p:ext>
     </p:extLst>
   </p:cSld>
@@ -4562,7 +4901,15 @@
           <a:p>
             <a:r>
               <a:rPr lang="hu-HU" dirty="0"/>
-              <a:t>Mindkettő egy-egy absztrakcióval foglalkozik (magas szintű programozási nyelvek, végrehajthaó modellezés), így ez ihlette meg az előadás témáját</a:t>
+              <a:t>Mindkettő egy-egy absztrakcióval foglalkozik (magas szintű programozási nyelvek, </a:t>
+            </a:r>
+            <a:r>
+              <a:rPr lang="hu-HU" dirty="0" smtClean="0"/>
+              <a:t>végrehajtható </a:t>
+            </a:r>
+            <a:r>
+              <a:rPr lang="hu-HU" dirty="0"/>
+              <a:t>modellezés), így ez ihlette meg az előadás témáját</a:t>
             </a:r>
           </a:p>
         </p:txBody>
@@ -4632,23 +4979,25 @@
         </p:nvSpPr>
         <p:spPr/>
         <p:txBody>
-          <a:bodyPr/>
-          <a:lstStyle/>
-          <a:p>
-            <a:r>
-              <a:rPr lang="hu-HU" dirty="0"/>
+          <a:bodyPr>
+            <a:normAutofit/>
+          </a:bodyPr>
+          <a:lstStyle/>
+          <a:p>
+            <a:r>
+              <a:rPr lang="hu-HU" sz="3600" dirty="0"/>
               <a:t>Elvonatkoztatás, a lényegtelen dolgok figyelmem kívűl hagyása</a:t>
             </a:r>
           </a:p>
           <a:p>
             <a:r>
-              <a:rPr lang="hu-HU" dirty="0"/>
+              <a:rPr lang="hu-HU" sz="3600" dirty="0"/>
               <a:t>Esetünkben: Minél jobban eltávolodunk a gépi kódtól, és emberi gondolkodáshoz közelibb leírást választunk</a:t>
             </a:r>
           </a:p>
           <a:p>
             <a:r>
-              <a:rPr lang="hu-HU" dirty="0"/>
+              <a:rPr lang="hu-HU" sz="3600" dirty="0"/>
               <a:t>Elvonatkoztatunk attól a kódtól, amit a gép megért, és saját jelrendszert alkotunk</a:t>
             </a:r>
           </a:p>
@@ -4917,8 +5266,37 @@
                 <a:effectLst/>
                 <a:latin typeface="Arial" panose="020B0604020202020204" pitchFamily="34" charset="0"/>
               </a:rPr>
-              <a:t> első bájt a mozgatás utasítás, a második pedig a 61-es érték.</a:t>
-            </a:r>
+              <a:t> első bájt a mozgatás utasítás, a második pedig a </a:t>
+            </a:r>
+            <a:r>
+              <a:rPr lang="hu-HU" altLang="hu-HU" dirty="0" smtClean="0">
+                <a:latin typeface="Arial" panose="020B0604020202020204" pitchFamily="34" charset="0"/>
+              </a:rPr>
+              <a:t>10</a:t>
+            </a:r>
+            <a:r>
+              <a:rPr kumimoji="0" lang="hu-HU" altLang="hu-HU" b="0" i="0" u="none" strike="noStrike" cap="none" normalizeH="0" dirty="0" smtClean="0">
+                <a:ln>
+                  <a:noFill/>
+                </a:ln>
+                <a:solidFill>
+                  <a:schemeClr val="tx1"/>
+                </a:solidFill>
+                <a:effectLst/>
+                <a:latin typeface="Arial" panose="020B0604020202020204" pitchFamily="34" charset="0"/>
+              </a:rPr>
+              <a:t>-es érték binárisan felírva 1 bájton.</a:t>
+            </a:r>
+            <a:endParaRPr kumimoji="0" lang="hu-HU" altLang="hu-HU" b="0" i="0" u="none" strike="noStrike" cap="none" normalizeH="0" dirty="0">
+              <a:ln>
+                <a:noFill/>
+              </a:ln>
+              <a:solidFill>
+                <a:schemeClr val="tx1"/>
+              </a:solidFill>
+              <a:effectLst/>
+              <a:latin typeface="Arial" panose="020B0604020202020204" pitchFamily="34" charset="0"/>
+            </a:endParaRPr>
           </a:p>
           <a:p>
             <a:pPr lvl="0"/>
@@ -4932,7 +5310,19 @@
               <a:rPr lang="hu-HU" altLang="hu-HU" dirty="0">
                 <a:latin typeface="Arial" panose="020B0604020202020204" pitchFamily="34" charset="0"/>
               </a:rPr>
-              <a:t> sorozatot pedig programnak nevezzük</a:t>
+              <a:t> </a:t>
+            </a:r>
+            <a:r>
+              <a:rPr lang="hu-HU" altLang="hu-HU" dirty="0" smtClean="0">
+                <a:latin typeface="Arial" panose="020B0604020202020204" pitchFamily="34" charset="0"/>
+              </a:rPr>
+              <a:t>sorozatát </a:t>
+            </a:r>
+            <a:r>
+              <a:rPr lang="hu-HU" altLang="hu-HU" dirty="0">
+                <a:latin typeface="Arial" panose="020B0604020202020204" pitchFamily="34" charset="0"/>
+              </a:rPr>
+              <a:t>pedig programnak nevezzük</a:t>
             </a:r>
             <a:endParaRPr kumimoji="0" lang="hu-HU" altLang="hu-HU" b="0" i="0" u="none" strike="noStrike" cap="none" normalizeH="0" baseline="0" dirty="0">
               <a:ln>
@@ -4961,6 +5351,411 @@
 </file>
 
 <file path=ppt/slides/slide6.xml><?xml version="1.0" encoding="utf-8"?>
+<p:sld xmlns:a="http://schemas.openxmlformats.org/drawingml/2006/main" xmlns:r="http://schemas.openxmlformats.org/officeDocument/2006/relationships" xmlns:p="http://schemas.openxmlformats.org/presentationml/2006/main">
+  <p:cSld>
+    <p:spTree>
+      <p:nvGrpSpPr>
+        <p:cNvPr id="1" name=""/>
+        <p:cNvGrpSpPr/>
+        <p:nvPr/>
+      </p:nvGrpSpPr>
+      <p:grpSpPr>
+        <a:xfrm>
+          <a:off x="0" y="0"/>
+          <a:ext cx="0" cy="0"/>
+          <a:chOff x="0" y="0"/>
+          <a:chExt cx="0" cy="0"/>
+        </a:xfrm>
+      </p:grpSpPr>
+      <p:sp>
+        <p:nvSpPr>
+          <p:cNvPr id="2" name="Title 1"/>
+          <p:cNvSpPr>
+            <a:spLocks noGrp="1"/>
+          </p:cNvSpPr>
+          <p:nvPr>
+            <p:ph type="title"/>
+          </p:nvPr>
+        </p:nvSpPr>
+        <p:spPr/>
+        <p:txBody>
+          <a:bodyPr/>
+          <a:lstStyle/>
+          <a:p>
+            <a:pPr algn="ctr"/>
+            <a:r>
+              <a:rPr lang="hu-HU" dirty="0" smtClean="0"/>
+              <a:t>Információs rendszerek táblázat </a:t>
+            </a:r>
+            <a:endParaRPr lang="hu-HU" dirty="0"/>
+          </a:p>
+        </p:txBody>
+      </p:sp>
+      <p:graphicFrame>
+        <p:nvGraphicFramePr>
+          <p:cNvPr id="6" name="Content Placeholder 5"/>
+          <p:cNvGraphicFramePr>
+            <a:graphicFrameLocks noGrp="1"/>
+          </p:cNvGraphicFramePr>
+          <p:nvPr>
+            <p:ph idx="1"/>
+            <p:extLst>
+              <p:ext uri="{D42A27DB-BD31-4B8C-83A1-F6EECF244321}">
+                <p14:modId xmlns:p14="http://schemas.microsoft.com/office/powerpoint/2010/main" val="4123232883"/>
+              </p:ext>
+            </p:extLst>
+          </p:nvPr>
+        </p:nvGraphicFramePr>
+        <p:xfrm>
+          <a:off x="838200" y="1825625"/>
+          <a:ext cx="10515600" cy="4227445"/>
+        </p:xfrm>
+        <a:graphic>
+          <a:graphicData uri="http://schemas.openxmlformats.org/drawingml/2006/table">
+            <a:tbl>
+              <a:tblPr firstRow="1" bandRow="1">
+                <a:tableStyleId>{5C22544A-7EE6-4342-B048-85BDC9FD1C3A}</a:tableStyleId>
+              </a:tblPr>
+              <a:tblGrid>
+                <a:gridCol w="3505200">
+                  <a:extLst>
+                    <a:ext uri="{9D8B030D-6E8A-4147-A177-3AD203B41FA5}">
+                      <a16:colId xmlns:a16="http://schemas.microsoft.com/office/drawing/2014/main" val="1877454009"/>
+                    </a:ext>
+                  </a:extLst>
+                </a:gridCol>
+                <a:gridCol w="3505200">
+                  <a:extLst>
+                    <a:ext uri="{9D8B030D-6E8A-4147-A177-3AD203B41FA5}">
+                      <a16:colId xmlns:a16="http://schemas.microsoft.com/office/drawing/2014/main" val="464310206"/>
+                    </a:ext>
+                  </a:extLst>
+                </a:gridCol>
+                <a:gridCol w="3505200">
+                  <a:extLst>
+                    <a:ext uri="{9D8B030D-6E8A-4147-A177-3AD203B41FA5}">
+                      <a16:colId xmlns:a16="http://schemas.microsoft.com/office/drawing/2014/main" val="4049477790"/>
+                    </a:ext>
+                  </a:extLst>
+                </a:gridCol>
+              </a:tblGrid>
+              <a:tr h="845489">
+                <a:tc>
+                  <a:txBody>
+                    <a:bodyPr/>
+                    <a:lstStyle/>
+                    <a:p>
+                      <a:r>
+                        <a:rPr lang="hu-HU" dirty="0" smtClean="0"/>
+                        <a:t>Fő Informáci</a:t>
+                      </a:r>
+                      <a:r>
+                        <a:rPr lang="hu-HU" baseline="0" dirty="0" smtClean="0"/>
+                        <a:t>ó Fajták</a:t>
+                      </a:r>
+                      <a:endParaRPr lang="hu-HU" dirty="0"/>
+                    </a:p>
+                  </a:txBody>
+                  <a:tcPr/>
+                </a:tc>
+                <a:tc>
+                  <a:txBody>
+                    <a:bodyPr/>
+                    <a:lstStyle/>
+                    <a:p>
+                      <a:r>
+                        <a:rPr lang="hu-HU" dirty="0" smtClean="0"/>
+                        <a:t>Jelek száma</a:t>
+                      </a:r>
+                      <a:endParaRPr lang="hu-HU" dirty="0"/>
+                    </a:p>
+                  </a:txBody>
+                  <a:tcPr/>
+                </a:tc>
+                <a:tc>
+                  <a:txBody>
+                    <a:bodyPr/>
+                    <a:lstStyle/>
+                    <a:p>
+                      <a:r>
+                        <a:rPr lang="hu-HU" dirty="0" smtClean="0"/>
+                        <a:t>Mihez kell?</a:t>
+                      </a:r>
+                      <a:endParaRPr lang="hu-HU" dirty="0"/>
+                    </a:p>
+                  </a:txBody>
+                  <a:tcPr/>
+                </a:tc>
+                <a:extLst>
+                  <a:ext uri="{0D108BD9-81ED-4DB2-BD59-A6C34878D82A}">
+                    <a16:rowId xmlns:a16="http://schemas.microsoft.com/office/drawing/2014/main" val="2328683889"/>
+                  </a:ext>
+                </a:extLst>
+              </a:tr>
+              <a:tr h="845489">
+                <a:tc>
+                  <a:txBody>
+                    <a:bodyPr/>
+                    <a:lstStyle/>
+                    <a:p>
+                      <a:r>
+                        <a:rPr lang="hu-HU" dirty="0" smtClean="0"/>
+                        <a:t>Genetikai</a:t>
+                      </a:r>
+                      <a:r>
+                        <a:rPr lang="hu-HU" baseline="0" dirty="0" smtClean="0"/>
+                        <a:t> információ</a:t>
+                      </a:r>
+                      <a:endParaRPr lang="hu-HU" dirty="0"/>
+                    </a:p>
+                  </a:txBody>
+                  <a:tcPr/>
+                </a:tc>
+                <a:tc>
+                  <a:txBody>
+                    <a:bodyPr/>
+                    <a:lstStyle/>
+                    <a:p>
+                      <a:r>
+                        <a:rPr lang="hu-HU" dirty="0" smtClean="0"/>
+                        <a:t> 4 (A,T,G,C)</a:t>
+                      </a:r>
+                      <a:endParaRPr lang="hu-HU" dirty="0"/>
+                    </a:p>
+                  </a:txBody>
+                  <a:tcPr/>
+                </a:tc>
+                <a:tc>
+                  <a:txBody>
+                    <a:bodyPr/>
+                    <a:lstStyle/>
+                    <a:p>
+                      <a:r>
+                        <a:rPr lang="hu-HU" dirty="0" smtClean="0"/>
+                        <a:t>Élet</a:t>
+                      </a:r>
+                      <a:endParaRPr lang="hu-HU" dirty="0"/>
+                    </a:p>
+                  </a:txBody>
+                  <a:tcPr/>
+                </a:tc>
+                <a:extLst>
+                  <a:ext uri="{0D108BD9-81ED-4DB2-BD59-A6C34878D82A}">
+                    <a16:rowId xmlns:a16="http://schemas.microsoft.com/office/drawing/2014/main" val="4087166601"/>
+                  </a:ext>
+                </a:extLst>
+              </a:tr>
+              <a:tr h="845489">
+                <a:tc>
+                  <a:txBody>
+                    <a:bodyPr/>
+                    <a:lstStyle/>
+                    <a:p>
+                      <a:r>
+                        <a:rPr lang="hu-HU" dirty="0" smtClean="0"/>
+                        <a:t>Beszéd</a:t>
+                      </a:r>
+                      <a:endParaRPr lang="hu-HU" dirty="0"/>
+                    </a:p>
+                  </a:txBody>
+                  <a:tcPr/>
+                </a:tc>
+                <a:tc>
+                  <a:txBody>
+                    <a:bodyPr/>
+                    <a:lstStyle/>
+                    <a:p>
+                      <a:r>
+                        <a:rPr lang="hu-HU" dirty="0" smtClean="0"/>
+                        <a:t>30-50 (hangok)</a:t>
+                      </a:r>
+                      <a:endParaRPr lang="hu-HU" dirty="0"/>
+                    </a:p>
+                  </a:txBody>
+                  <a:tcPr/>
+                </a:tc>
+                <a:tc>
+                  <a:txBody>
+                    <a:bodyPr/>
+                    <a:lstStyle/>
+                    <a:p>
+                      <a:r>
+                        <a:rPr lang="hu-HU" dirty="0" smtClean="0"/>
+                        <a:t>Emberi közösség</a:t>
+                      </a:r>
+                      <a:endParaRPr lang="hu-HU" dirty="0"/>
+                    </a:p>
+                  </a:txBody>
+                  <a:tcPr/>
+                </a:tc>
+                <a:extLst>
+                  <a:ext uri="{0D108BD9-81ED-4DB2-BD59-A6C34878D82A}">
+                    <a16:rowId xmlns:a16="http://schemas.microsoft.com/office/drawing/2014/main" val="319119834"/>
+                  </a:ext>
+                </a:extLst>
+              </a:tr>
+              <a:tr h="845489">
+                <a:tc>
+                  <a:txBody>
+                    <a:bodyPr/>
+                    <a:lstStyle/>
+                    <a:p>
+                      <a:r>
+                        <a:rPr lang="hu-HU" dirty="0" smtClean="0"/>
+                        <a:t>Írás</a:t>
+                      </a:r>
+                      <a:endParaRPr lang="hu-HU" dirty="0"/>
+                    </a:p>
+                  </a:txBody>
+                  <a:tcPr/>
+                </a:tc>
+                <a:tc>
+                  <a:txBody>
+                    <a:bodyPr/>
+                    <a:lstStyle/>
+                    <a:p>
+                      <a:r>
+                        <a:rPr lang="hu-HU" dirty="0" smtClean="0"/>
+                        <a:t>30-40</a:t>
+                      </a:r>
+                      <a:r>
+                        <a:rPr lang="hu-HU" baseline="0" dirty="0" smtClean="0"/>
+                        <a:t> betű</a:t>
+                      </a:r>
+                      <a:endParaRPr lang="hu-HU" dirty="0"/>
+                    </a:p>
+                  </a:txBody>
+                  <a:tcPr/>
+                </a:tc>
+                <a:tc>
+                  <a:txBody>
+                    <a:bodyPr/>
+                    <a:lstStyle/>
+                    <a:p>
+                      <a:r>
+                        <a:rPr lang="hu-HU" dirty="0" smtClean="0"/>
+                        <a:t>Államszervezet</a:t>
+                      </a:r>
+                      <a:endParaRPr lang="hu-HU" dirty="0"/>
+                    </a:p>
+                  </a:txBody>
+                  <a:tcPr/>
+                </a:tc>
+                <a:extLst>
+                  <a:ext uri="{0D108BD9-81ED-4DB2-BD59-A6C34878D82A}">
+                    <a16:rowId xmlns:a16="http://schemas.microsoft.com/office/drawing/2014/main" val="2686581036"/>
+                  </a:ext>
+                </a:extLst>
+              </a:tr>
+              <a:tr h="845489">
+                <a:tc>
+                  <a:txBody>
+                    <a:bodyPr/>
+                    <a:lstStyle/>
+                    <a:p>
+                      <a:r>
+                        <a:rPr lang="hu-HU" dirty="0" smtClean="0"/>
+                        <a:t>Számítógép</a:t>
+                      </a:r>
+                      <a:endParaRPr lang="hu-HU" dirty="0"/>
+                    </a:p>
+                  </a:txBody>
+                  <a:tcPr/>
+                </a:tc>
+                <a:tc>
+                  <a:txBody>
+                    <a:bodyPr/>
+                    <a:lstStyle/>
+                    <a:p>
+                      <a:r>
+                        <a:rPr lang="hu-HU" dirty="0" smtClean="0"/>
+                        <a:t>2 (0,1)</a:t>
+                      </a:r>
+                      <a:endParaRPr lang="hu-HU" dirty="0"/>
+                    </a:p>
+                  </a:txBody>
+                  <a:tcPr/>
+                </a:tc>
+                <a:tc>
+                  <a:txBody>
+                    <a:bodyPr/>
+                    <a:lstStyle/>
+                    <a:p>
+                      <a:r>
+                        <a:rPr lang="hu-HU" dirty="0" smtClean="0"/>
+                        <a:t>Modern társadalom</a:t>
+                      </a:r>
+                      <a:endParaRPr lang="hu-HU" dirty="0"/>
+                    </a:p>
+                  </a:txBody>
+                  <a:tcPr/>
+                </a:tc>
+                <a:extLst>
+                  <a:ext uri="{0D108BD9-81ED-4DB2-BD59-A6C34878D82A}">
+                    <a16:rowId xmlns:a16="http://schemas.microsoft.com/office/drawing/2014/main" val="276412899"/>
+                  </a:ext>
+                </a:extLst>
+              </a:tr>
+            </a:tbl>
+          </a:graphicData>
+        </a:graphic>
+      </p:graphicFrame>
+      <p:sp>
+        <p:nvSpPr>
+          <p:cNvPr id="7" name="TextBox 6"/>
+          <p:cNvSpPr txBox="1"/>
+          <p:nvPr/>
+        </p:nvSpPr>
+        <p:spPr>
+          <a:xfrm>
+            <a:off x="7803931" y="230188"/>
+            <a:ext cx="4903076" cy="369332"/>
+          </a:xfrm>
+          <a:prstGeom prst="rect">
+            <a:avLst/>
+          </a:prstGeom>
+          <a:noFill/>
+        </p:spPr>
+        <p:txBody>
+          <a:bodyPr wrap="square" rtlCol="0">
+            <a:spAutoFit/>
+          </a:bodyPr>
+          <a:lstStyle/>
+          <a:p>
+            <a:r>
+              <a:rPr lang="hu-HU" dirty="0" smtClean="0"/>
+              <a:t>Forrás: </a:t>
+            </a:r>
+            <a:r>
+              <a:rPr lang="nb-NO" dirty="0"/>
+              <a:t>I. N. Smertele </a:t>
+            </a:r>
+            <a:r>
+              <a:rPr lang="nb-NO" dirty="0" smtClean="0"/>
+              <a:t>– </a:t>
+            </a:r>
+            <a:r>
+              <a:rPr lang="hu-HU" dirty="0" smtClean="0"/>
+              <a:t>Az élet alapkérdései</a:t>
+            </a:r>
+            <a:endParaRPr lang="hu-HU" dirty="0"/>
+          </a:p>
+        </p:txBody>
+      </p:sp>
+    </p:spTree>
+    <p:extLst>
+      <p:ext uri="{BB962C8B-B14F-4D97-AF65-F5344CB8AC3E}">
+        <p14:creationId xmlns:p14="http://schemas.microsoft.com/office/powerpoint/2010/main" val="2381927187"/>
+      </p:ext>
+    </p:extLst>
+  </p:cSld>
+  <p:clrMapOvr>
+    <a:masterClrMapping/>
+  </p:clrMapOvr>
+</p:sld>
+</file>
+
+<file path=ppt/slides/slide7.xml><?xml version="1.0" encoding="utf-8"?>
 <p:sld xmlns:a="http://schemas.openxmlformats.org/drawingml/2006/main" xmlns:r="http://schemas.openxmlformats.org/officeDocument/2006/relationships" xmlns:p="http://schemas.openxmlformats.org/presentationml/2006/main">
   <p:cSld>
     <p:spTree>
@@ -5263,117 +6058,40 @@
           </p:txBody>
         </p:sp>
       </p:grpSp>
+      <p:sp>
+        <p:nvSpPr>
+          <p:cNvPr id="10" name="TextBox 9"/>
+          <p:cNvSpPr txBox="1"/>
+          <p:nvPr/>
+        </p:nvSpPr>
+        <p:spPr>
+          <a:xfrm>
+            <a:off x="7361647" y="6211668"/>
+            <a:ext cx="4903076" cy="646331"/>
+          </a:xfrm>
+          <a:prstGeom prst="rect">
+            <a:avLst/>
+          </a:prstGeom>
+          <a:noFill/>
+        </p:spPr>
+        <p:txBody>
+          <a:bodyPr wrap="square" rtlCol="0">
+            <a:spAutoFit/>
+          </a:bodyPr>
+          <a:lstStyle/>
+          <a:p>
+            <a:r>
+              <a:rPr lang="hu-HU" dirty="0" smtClean="0"/>
+              <a:t>Példa forrás: Dévai Gergely – Fordítóprogramok bevezető előadás</a:t>
+            </a:r>
+            <a:endParaRPr lang="hu-HU" dirty="0"/>
+          </a:p>
+        </p:txBody>
+      </p:sp>
     </p:spTree>
     <p:extLst>
       <p:ext uri="{BB962C8B-B14F-4D97-AF65-F5344CB8AC3E}">
         <p14:creationId xmlns:p14="http://schemas.microsoft.com/office/powerpoint/2010/main" val="388039760"/>
-      </p:ext>
-    </p:extLst>
-  </p:cSld>
-  <p:clrMapOvr>
-    <a:masterClrMapping/>
-  </p:clrMapOvr>
-</p:sld>
-</file>
-
-<file path=ppt/slides/slide7.xml><?xml version="1.0" encoding="utf-8"?>
-<p:sld xmlns:a="http://schemas.openxmlformats.org/drawingml/2006/main" xmlns:r="http://schemas.openxmlformats.org/officeDocument/2006/relationships" xmlns:p="http://schemas.openxmlformats.org/presentationml/2006/main">
-  <p:cSld>
-    <p:spTree>
-      <p:nvGrpSpPr>
-        <p:cNvPr id="1" name=""/>
-        <p:cNvGrpSpPr/>
-        <p:nvPr/>
-      </p:nvGrpSpPr>
-      <p:grpSpPr>
-        <a:xfrm>
-          <a:off x="0" y="0"/>
-          <a:ext cx="0" cy="0"/>
-          <a:chOff x="0" y="0"/>
-          <a:chExt cx="0" cy="0"/>
-        </a:xfrm>
-      </p:grpSpPr>
-      <p:sp>
-        <p:nvSpPr>
-          <p:cNvPr id="2" name="Title 1"/>
-          <p:cNvSpPr>
-            <a:spLocks noGrp="1"/>
-          </p:cNvSpPr>
-          <p:nvPr>
-            <p:ph type="title"/>
-          </p:nvPr>
-        </p:nvSpPr>
-        <p:spPr/>
-        <p:txBody>
-          <a:bodyPr/>
-          <a:lstStyle/>
-          <a:p>
-            <a:pPr algn="ctr"/>
-            <a:r>
-              <a:rPr lang="hu-HU" dirty="0"/>
-              <a:t>Első lépcső: Assembly kód</a:t>
-            </a:r>
-          </a:p>
-        </p:txBody>
-      </p:sp>
-      <p:sp>
-        <p:nvSpPr>
-          <p:cNvPr id="3" name="Content Placeholder 2"/>
-          <p:cNvSpPr>
-            <a:spLocks noGrp="1"/>
-          </p:cNvSpPr>
-          <p:nvPr>
-            <p:ph idx="1"/>
-          </p:nvPr>
-        </p:nvSpPr>
-        <p:spPr/>
-        <p:txBody>
-          <a:bodyPr>
-            <a:normAutofit fontScale="92500"/>
-          </a:bodyPr>
-          <a:lstStyle/>
-          <a:p>
-            <a:r>
-              <a:rPr lang="hu-HU" dirty="0"/>
-              <a:t>A gépi kód utasításaihoz neveket rendelünk</a:t>
-            </a:r>
-          </a:p>
-          <a:p>
-            <a:r>
-              <a:rPr lang="hu-HU" dirty="0"/>
-              <a:t>Egyel magasabb absztrakciós szint: Minek jegyezzek meg számokat, amikor neveket egyszerűbb..</a:t>
-            </a:r>
-          </a:p>
-          <a:p>
-            <a:r>
-              <a:rPr lang="hu-HU" dirty="0"/>
-              <a:t>Pl: a 10111001 (B9) sorozat azt jelenti, hogy mozgatni szeretnék az ecx regiszterbe (memóriterület a processzorban), assemblyben: mov ecx</a:t>
-            </a:r>
-          </a:p>
-          <a:p>
-            <a:r>
-              <a:rPr lang="hu-HU" dirty="0"/>
-              <a:t>A számokat pedig decimálisan is leírhatjuk: Pl 00001010 (0A) a 10-es decimális számnak felel meg</a:t>
-            </a:r>
-          </a:p>
-          <a:p>
-            <a:r>
-              <a:rPr lang="hu-HU" dirty="0"/>
-              <a:t>Így a 10111001 00001010 leírhatjuk úgy, hogy mov ecx 10</a:t>
-            </a:r>
-          </a:p>
-          <a:p>
-            <a:r>
-              <a:rPr lang="hu-HU" dirty="0"/>
-              <a:t>Fordítóprogramja az Assembler, a szöveges utasításokat gépi utasításokká konverálja</a:t>
-            </a:r>
-          </a:p>
-        </p:txBody>
-      </p:sp>
-    </p:spTree>
-    <p:extLst>
-      <p:ext uri="{BB962C8B-B14F-4D97-AF65-F5344CB8AC3E}">
-        <p14:creationId xmlns:p14="http://schemas.microsoft.com/office/powerpoint/2010/main" val="2023384198"/>
       </p:ext>
     </p:extLst>
   </p:cSld>
@@ -5418,13 +6136,8 @@
             <a:pPr algn="ctr"/>
             <a:r>
               <a:rPr lang="hu-HU" dirty="0"/>
-              <a:t>Második </a:t>
-            </a:r>
-            <a:r>
-              <a:rPr lang="hu-HU" dirty="0" smtClean="0"/>
-              <a:t>lépcső: Magasabb szintű nyelvek</a:t>
-            </a:r>
-            <a:endParaRPr lang="hu-HU" dirty="0"/>
+              <a:t>Első lépcső: Assembly kód</a:t>
+            </a:r>
           </a:p>
         </p:txBody>
       </p:sp>
@@ -5438,77 +6151,54 @@
             <p:ph idx="1"/>
           </p:nvPr>
         </p:nvSpPr>
-        <p:spPr>
-          <a:xfrm>
-            <a:off x="838200" y="1825625"/>
-            <a:ext cx="10515600" cy="4613812"/>
-          </a:xfrm>
-        </p:spPr>
-        <p:txBody>
-          <a:bodyPr/>
+        <p:spPr/>
+        <p:txBody>
+          <a:bodyPr>
+            <a:normAutofit fontScale="92500"/>
+          </a:bodyPr>
           <a:lstStyle/>
           <a:p>
             <a:r>
               <a:rPr lang="hu-HU" dirty="0"/>
-              <a:t>Assembly-re könnyebb fordítani, mint közvetlen gép kódra (mivel már eggyel magasabb szintű absztrakció)</a:t>
+              <a:t>A gépi kód utasításaihoz neveket rendelünk</a:t>
             </a:r>
           </a:p>
           <a:p>
             <a:r>
               <a:rPr lang="hu-HU" dirty="0"/>
-              <a:t>Így a „magasabb szintű” nyelvek már csak arra fordulnak</a:t>
-            </a:r>
-            <a:r>
-              <a:rPr lang="hu-HU" dirty="0" smtClean="0"/>
-              <a:t>. (C, Fortan)</a:t>
-            </a:r>
-            <a:endParaRPr lang="hu-HU" dirty="0"/>
+              <a:t>Egyel magasabb absztrakciós szint: Minek jegyezzek meg számokat, amikor neveket egyszerűbb..</a:t>
+            </a:r>
           </a:p>
           <a:p>
             <a:r>
               <a:rPr lang="hu-HU" dirty="0"/>
-              <a:t>Mi hiányzik assemblyből?</a:t>
-            </a:r>
-          </a:p>
-          <a:p>
-            <a:pPr lvl="1"/>
+              <a:t>Pl: a 10111001 (B9) sorozat azt jelenti, hogy mozgatni szeretnék az ecx regiszterbe (memóriterület a processzorban), assemblyben: mov ecx</a:t>
+            </a:r>
+          </a:p>
+          <a:p>
             <a:r>
               <a:rPr lang="hu-HU" dirty="0"/>
-              <a:t>Vezérlési szerkezetek (ciklus, elágazás)</a:t>
-            </a:r>
-          </a:p>
-          <a:p>
-            <a:pPr lvl="1"/>
+              <a:t>A számokat pedig decimálisan is leírhatjuk: Pl 00001010 (0A) a 10-es decimális számnak felel meg</a:t>
+            </a:r>
+          </a:p>
+          <a:p>
             <a:r>
               <a:rPr lang="hu-HU" dirty="0"/>
-              <a:t>Értékadások</a:t>
-            </a:r>
-          </a:p>
-          <a:p>
-            <a:pPr lvl="1"/>
+              <a:t>Így a 10111001 00001010 leírhatjuk úgy, hogy mov ecx 10</a:t>
+            </a:r>
+          </a:p>
+          <a:p>
             <a:r>
               <a:rPr lang="hu-HU" dirty="0"/>
-              <a:t>Típusok (pl. Egész számok, valós számok, logikai értékek, stb</a:t>
-            </a:r>
-            <a:r>
-              <a:rPr lang="hu-HU" dirty="0" smtClean="0"/>
-              <a:t>)</a:t>
-            </a:r>
-          </a:p>
-          <a:p>
-            <a:pPr lvl="1"/>
-            <a:r>
-              <a:rPr lang="hu-HU" dirty="0" smtClean="0"/>
-              <a:t>Programrészek kiemelése</a:t>
-            </a:r>
-            <a:endParaRPr lang="hu-HU" dirty="0"/>
+              <a:t>Fordítóprogramja az Assembler, a szöveges utasításokat gépi utasításokká konverálja</a:t>
+            </a:r>
           </a:p>
         </p:txBody>
       </p:sp>
     </p:spTree>
     <p:extLst>
       <p:ext uri="{BB962C8B-B14F-4D97-AF65-F5344CB8AC3E}">
-        <p14:creationId xmlns:p14="http://schemas.microsoft.com/office/powerpoint/2010/main" val="3727760569"/>
+        <p14:creationId xmlns:p14="http://schemas.microsoft.com/office/powerpoint/2010/main" val="2023384198"/>
       </p:ext>
     </p:extLst>
   </p:cSld>
@@ -5545,100 +6235,96 @@
             <p:ph type="title"/>
           </p:nvPr>
         </p:nvSpPr>
+        <p:spPr/>
+        <p:txBody>
+          <a:bodyPr/>
+          <a:lstStyle/>
+          <a:p>
+            <a:pPr algn="ctr"/>
+            <a:r>
+              <a:rPr lang="hu-HU" dirty="0"/>
+              <a:t>Második </a:t>
+            </a:r>
+            <a:r>
+              <a:rPr lang="hu-HU" dirty="0" smtClean="0"/>
+              <a:t>lépcső: Magasabb szintű nyelvek</a:t>
+            </a:r>
+            <a:endParaRPr lang="hu-HU" dirty="0"/>
+          </a:p>
+        </p:txBody>
+      </p:sp>
+      <p:sp>
+        <p:nvSpPr>
+          <p:cNvPr id="3" name="Content Placeholder 2"/>
+          <p:cNvSpPr>
+            <a:spLocks noGrp="1"/>
+          </p:cNvSpPr>
+          <p:nvPr>
+            <p:ph idx="1"/>
+          </p:nvPr>
+        </p:nvSpPr>
         <p:spPr>
           <a:xfrm>
-            <a:off x="838200" y="-164744"/>
-            <a:ext cx="10515600" cy="1325563"/>
+            <a:off x="838200" y="1825625"/>
+            <a:ext cx="10515600" cy="4613812"/>
           </a:xfrm>
         </p:spPr>
         <p:txBody>
           <a:bodyPr/>
           <a:lstStyle/>
           <a:p>
-            <a:pPr algn="ctr"/>
             <a:r>
               <a:rPr lang="hu-HU" dirty="0"/>
-              <a:t>Második lépcső</a:t>
-            </a:r>
-          </a:p>
-        </p:txBody>
-      </p:sp>
-      <p:sp>
-        <p:nvSpPr>
-          <p:cNvPr id="3" name="Content Placeholder 2"/>
-          <p:cNvSpPr>
-            <a:spLocks noGrp="1"/>
-          </p:cNvSpPr>
-          <p:nvPr>
-            <p:ph idx="1"/>
-          </p:nvPr>
-        </p:nvSpPr>
-        <p:spPr>
-          <a:xfrm>
-            <a:off x="722290" y="1576463"/>
-            <a:ext cx="10515600" cy="4351338"/>
-          </a:xfrm>
-        </p:spPr>
-        <p:txBody>
-          <a:bodyPr>
-            <a:normAutofit lnSpcReduction="10000"/>
-          </a:bodyPr>
-          <a:lstStyle/>
+              <a:t>Assembly-re könnyebb fordítani, mint közvetlen gép kódra (mivel már eggyel magasabb szintű absztrakció)</a:t>
+            </a:r>
+          </a:p>
           <a:p>
             <a:r>
               <a:rPr lang="hu-HU" dirty="0"/>
-              <a:t>Nincsenek regiszterek, csak általunk elnvezett tárterületek</a:t>
-            </a:r>
+              <a:t>Így a „magasabb szintű” nyelvek már csak arra fordulnak</a:t>
+            </a:r>
+            <a:r>
+              <a:rPr lang="hu-HU" dirty="0" smtClean="0"/>
+              <a:t>. (C, Fortan)</a:t>
+            </a:r>
+            <a:endParaRPr lang="hu-HU" dirty="0"/>
           </a:p>
           <a:p>
             <a:r>
               <a:rPr lang="hu-HU" dirty="0"/>
-              <a:t>Értékadás: Egy általam felcimkézett tárteülernek értéket </a:t>
+              <a:t>Mi hiányzik assemblyből?</a:t>
+            </a:r>
+          </a:p>
+          <a:p>
+            <a:pPr lvl="1"/>
+            <a:r>
+              <a:rPr lang="hu-HU" dirty="0"/>
+              <a:t>Vezérlési szerkezetek (ciklus, elágazás)</a:t>
+            </a:r>
+          </a:p>
+          <a:p>
+            <a:pPr lvl="1"/>
+            <a:r>
+              <a:rPr lang="hu-HU" dirty="0"/>
+              <a:t>Értékadások</a:t>
+            </a:r>
+          </a:p>
+          <a:p>
+            <a:pPr lvl="1"/>
+            <a:r>
+              <a:rPr lang="hu-HU" dirty="0"/>
+              <a:t>Típusok (pl. Egész számok, valós számok, logikai értékek, stb</a:t>
             </a:r>
             <a:r>
               <a:rPr lang="hu-HU" dirty="0" smtClean="0"/>
-              <a:t>adok</a:t>
-            </a:r>
-            <a:endParaRPr lang="hu-HU" dirty="0"/>
-          </a:p>
-          <a:p>
-            <a:r>
-              <a:rPr lang="hu-HU" dirty="0"/>
-              <a:t>Elágazás: Ha valaminek az értéke ennyi, akkor csináld ezt meg azt</a:t>
-            </a:r>
-          </a:p>
-          <a:p>
-            <a:r>
-              <a:rPr lang="hu-HU" dirty="0"/>
-              <a:t>Ciklus: Csináld ugyanazt addig, amíg nem teljesül egy bizonyos feltétel</a:t>
-            </a:r>
+              <a:t>)</a:t>
+            </a:r>
+          </a:p>
+          <a:p>
+            <a:pPr lvl="1"/>
             <a:r>
               <a:rPr lang="hu-HU" dirty="0" smtClean="0"/>
-              <a:t>..</a:t>
-            </a:r>
-          </a:p>
-          <a:p>
-            <a:r>
-              <a:rPr lang="hu-HU" dirty="0"/>
-              <a:t>Programrészeket el tudok nevezni, ezáltal újra felhasználhatóvá </a:t>
-            </a:r>
-            <a:r>
-              <a:rPr lang="hu-HU" dirty="0" smtClean="0"/>
-              <a:t>teszem</a:t>
-            </a:r>
-          </a:p>
-          <a:p>
-            <a:r>
-              <a:rPr lang="hu-HU" dirty="0" smtClean="0"/>
-              <a:t>Assemblybe </a:t>
-            </a:r>
-            <a:r>
-              <a:rPr lang="hu-HU" dirty="0"/>
-              <a:t>nagyon körülményes ezeket leírni, mert a gépi utasításokat tudom csak használni </a:t>
-            </a:r>
-            <a:r>
-              <a:rPr lang="hu-HU" dirty="0" smtClean="0"/>
-              <a:t>hozzá (címkékre való ugrálgatás a jmp utasítással)</a:t>
+              <a:t>Programrészek kiemelése</a:t>
             </a:r>
             <a:endParaRPr lang="hu-HU" dirty="0"/>
           </a:p>
@@ -5647,7 +6333,7 @@
     </p:spTree>
     <p:extLst>
       <p:ext uri="{BB962C8B-B14F-4D97-AF65-F5344CB8AC3E}">
-        <p14:creationId xmlns:p14="http://schemas.microsoft.com/office/powerpoint/2010/main" val="1664118026"/>
+        <p14:creationId xmlns:p14="http://schemas.microsoft.com/office/powerpoint/2010/main" val="3727760569"/>
       </p:ext>
     </p:extLst>
   </p:cSld>

</xml_diff>

<commit_message>
Minor fixies in eas
</commit_message>
<xml_diff>
--- a/efop/03/Absztakciós szintek a programozásban.pptx
+++ b/efop/03/Absztakciós szintek a programozásban.pptx
@@ -271,7 +271,7 @@
           <a:p>
             <a:fld id="{2BC316B3-8804-47C0-8326-0629B3A2E3D7}" type="datetimeFigureOut">
               <a:rPr lang="hu-HU" smtClean="0"/>
-              <a:t>2018.10.02.</a:t>
+              <a:t>2018. 10. 05.</a:t>
             </a:fld>
             <a:endParaRPr lang="hu-HU"/>
           </a:p>
@@ -441,7 +441,7 @@
           <a:p>
             <a:fld id="{2BC316B3-8804-47C0-8326-0629B3A2E3D7}" type="datetimeFigureOut">
               <a:rPr lang="hu-HU" smtClean="0"/>
-              <a:t>2018.10.02.</a:t>
+              <a:t>2018. 10. 05.</a:t>
             </a:fld>
             <a:endParaRPr lang="hu-HU"/>
           </a:p>
@@ -621,7 +621,7 @@
           <a:p>
             <a:fld id="{2BC316B3-8804-47C0-8326-0629B3A2E3D7}" type="datetimeFigureOut">
               <a:rPr lang="hu-HU" smtClean="0"/>
-              <a:t>2018.10.02.</a:t>
+              <a:t>2018. 10. 05.</a:t>
             </a:fld>
             <a:endParaRPr lang="hu-HU"/>
           </a:p>
@@ -791,7 +791,7 @@
           <a:p>
             <a:fld id="{2BC316B3-8804-47C0-8326-0629B3A2E3D7}" type="datetimeFigureOut">
               <a:rPr lang="hu-HU" smtClean="0"/>
-              <a:t>2018.10.02.</a:t>
+              <a:t>2018. 10. 05.</a:t>
             </a:fld>
             <a:endParaRPr lang="hu-HU"/>
           </a:p>
@@ -1037,7 +1037,7 @@
           <a:p>
             <a:fld id="{2BC316B3-8804-47C0-8326-0629B3A2E3D7}" type="datetimeFigureOut">
               <a:rPr lang="hu-HU" smtClean="0"/>
-              <a:t>2018.10.02.</a:t>
+              <a:t>2018. 10. 05.</a:t>
             </a:fld>
             <a:endParaRPr lang="hu-HU"/>
           </a:p>
@@ -1269,7 +1269,7 @@
           <a:p>
             <a:fld id="{2BC316B3-8804-47C0-8326-0629B3A2E3D7}" type="datetimeFigureOut">
               <a:rPr lang="hu-HU" smtClean="0"/>
-              <a:t>2018.10.02.</a:t>
+              <a:t>2018. 10. 05.</a:t>
             </a:fld>
             <a:endParaRPr lang="hu-HU"/>
           </a:p>
@@ -1636,7 +1636,7 @@
           <a:p>
             <a:fld id="{2BC316B3-8804-47C0-8326-0629B3A2E3D7}" type="datetimeFigureOut">
               <a:rPr lang="hu-HU" smtClean="0"/>
-              <a:t>2018.10.02.</a:t>
+              <a:t>2018. 10. 05.</a:t>
             </a:fld>
             <a:endParaRPr lang="hu-HU"/>
           </a:p>
@@ -1754,7 +1754,7 @@
           <a:p>
             <a:fld id="{2BC316B3-8804-47C0-8326-0629B3A2E3D7}" type="datetimeFigureOut">
               <a:rPr lang="hu-HU" smtClean="0"/>
-              <a:t>2018.10.02.</a:t>
+              <a:t>2018. 10. 05.</a:t>
             </a:fld>
             <a:endParaRPr lang="hu-HU"/>
           </a:p>
@@ -1849,7 +1849,7 @@
           <a:p>
             <a:fld id="{2BC316B3-8804-47C0-8326-0629B3A2E3D7}" type="datetimeFigureOut">
               <a:rPr lang="hu-HU" smtClean="0"/>
-              <a:t>2018.10.02.</a:t>
+              <a:t>2018. 10. 05.</a:t>
             </a:fld>
             <a:endParaRPr lang="hu-HU"/>
           </a:p>
@@ -2126,7 +2126,7 @@
           <a:p>
             <a:fld id="{2BC316B3-8804-47C0-8326-0629B3A2E3D7}" type="datetimeFigureOut">
               <a:rPr lang="hu-HU" smtClean="0"/>
-              <a:t>2018.10.02.</a:t>
+              <a:t>2018. 10. 05.</a:t>
             </a:fld>
             <a:endParaRPr lang="hu-HU"/>
           </a:p>
@@ -2379,7 +2379,7 @@
           <a:p>
             <a:fld id="{2BC316B3-8804-47C0-8326-0629B3A2E3D7}" type="datetimeFigureOut">
               <a:rPr lang="hu-HU" smtClean="0"/>
-              <a:t>2018.10.02.</a:t>
+              <a:t>2018. 10. 05.</a:t>
             </a:fld>
             <a:endParaRPr lang="hu-HU"/>
           </a:p>
@@ -2597,7 +2597,7 @@
           <a:p>
             <a:fld id="{2BC316B3-8804-47C0-8326-0629B3A2E3D7}" type="datetimeFigureOut">
               <a:rPr lang="hu-HU" smtClean="0"/>
-              <a:t>2018.10.02.</a:t>
+              <a:t>2018. 10. 05.</a:t>
             </a:fld>
             <a:endParaRPr lang="hu-HU"/>
           </a:p>
@@ -3079,11 +3079,7 @@
           <a:p>
             <a:r>
               <a:rPr lang="hu-HU" dirty="0"/>
-              <a:t>Készítette: Nagy </a:t>
-            </a:r>
-            <a:r>
-              <a:rPr lang="hu-HU" dirty="0" smtClean="0"/>
-              <a:t>András</a:t>
+              <a:t>Készítette: Nagy András</a:t>
             </a:r>
           </a:p>
         </p:txBody>
@@ -3176,13 +3172,8 @@
           <a:p>
             <a:r>
               <a:rPr lang="hu-HU" sz="3200" dirty="0"/>
-              <a:t>Értékadás: Egy általam felcimkézett tárteülernek értéket </a:t>
-            </a:r>
-            <a:r>
-              <a:rPr lang="hu-HU" sz="3200" dirty="0" smtClean="0"/>
-              <a:t>adok</a:t>
-            </a:r>
-            <a:endParaRPr lang="hu-HU" sz="3200" dirty="0"/>
+              <a:t>Értékadás: Egy általam felcimkézett tárteülernek értéket adok</a:t>
+            </a:r>
           </a:p>
           <a:p>
             <a:r>
@@ -3193,45 +3184,20 @@
           <a:p>
             <a:r>
               <a:rPr lang="hu-HU" sz="3200" dirty="0"/>
-              <a:t>Ciklus: Csináld ugyanazt addig, amíg nem teljesül egy bizonyos feltétel</a:t>
-            </a:r>
-            <a:r>
-              <a:rPr lang="hu-HU" sz="3200" dirty="0" smtClean="0"/>
-              <a:t>..</a:t>
+              <a:t>Ciklus: Csináld ugyanazt addig, amíg nem teljesül egy bizonyos feltétel..</a:t>
             </a:r>
           </a:p>
           <a:p>
             <a:r>
               <a:rPr lang="hu-HU" sz="3200" dirty="0"/>
-              <a:t>Programrészeket el tudok nevezni, ezáltal újra felhasználhatóvá </a:t>
-            </a:r>
-            <a:r>
-              <a:rPr lang="hu-HU" sz="3200" dirty="0" smtClean="0"/>
-              <a:t>teszem</a:t>
-            </a:r>
-          </a:p>
-          <a:p>
-            <a:r>
-              <a:rPr lang="hu-HU" sz="3200" dirty="0" smtClean="0"/>
-              <a:t>Assemblybe </a:t>
-            </a:r>
+              <a:t>Programrészeket el tudok nevezni, ezáltal újra felhasználhatóvá teszem</a:t>
+            </a:r>
+          </a:p>
+          <a:p>
             <a:r>
               <a:rPr lang="hu-HU" sz="3200" dirty="0"/>
-              <a:t>nagyon körülményes ezeket leírni, mert a </a:t>
-            </a:r>
-            <a:r>
-              <a:rPr lang="hu-HU" sz="3200" dirty="0" smtClean="0"/>
-              <a:t>csak gépi </a:t>
-            </a:r>
-            <a:r>
-              <a:rPr lang="hu-HU" sz="3200" dirty="0"/>
-              <a:t>utasításokat tudom csak használni </a:t>
-            </a:r>
-            <a:r>
-              <a:rPr lang="hu-HU" sz="3200" dirty="0" smtClean="0"/>
-              <a:t>hozzá (pl. Címkére való ugrálás, lásd következő slide)</a:t>
-            </a:r>
-            <a:endParaRPr lang="hu-HU" sz="3200" dirty="0"/>
+              <a:t>Assemblybe nagyon körülményes ezeket leírni, mert csak a gépi utasításokat tudom használni hozzá (pl. címkére való ugrálás, lásd következő slide)</a:t>
+            </a:r>
           </a:p>
         </p:txBody>
       </p:sp>
@@ -3282,10 +3248,9 @@
           <a:p>
             <a:pPr algn="ctr"/>
             <a:r>
-              <a:rPr lang="hu-HU" dirty="0" smtClean="0"/>
+              <a:rPr lang="hu-HU" dirty="0"/>
               <a:t>Második lépcső - Példák</a:t>
             </a:r>
-            <a:endParaRPr lang="hu-HU" dirty="0"/>
           </a:p>
         </p:txBody>
       </p:sp>
@@ -3306,13 +3271,8 @@
           <a:p>
             <a:r>
               <a:rPr lang="hu-HU" dirty="0"/>
-              <a:t>Adjunk ennek valami jól érhető formát, vonatkoztassunk el a gépi utasításoktól, használjuk a saját nyelvünket rá</a:t>
-            </a:r>
-            <a:r>
-              <a:rPr lang="hu-HU" dirty="0" smtClean="0"/>
-              <a:t>:</a:t>
-            </a:r>
-            <a:endParaRPr lang="hu-HU" dirty="0"/>
+              <a:t>Adjunk ennek valami jól érhető formát, vonatkoztassunk el a gépi utasításoktól, használjuk a saját nyelvünket rá:</a:t>
+            </a:r>
           </a:p>
         </p:txBody>
       </p:sp>
@@ -3340,22 +3300,18 @@
           <a:p>
             <a:r>
               <a:rPr lang="hu-HU" dirty="0"/>
-              <a:t>If </a:t>
-            </a:r>
-            <a:r>
-              <a:rPr lang="hu-HU" dirty="0" smtClean="0"/>
-              <a:t>(i == 0) </a:t>
-            </a:r>
-          </a:p>
-          <a:p>
-            <a:r>
-              <a:rPr lang="hu-HU" dirty="0" smtClean="0"/>
+              <a:t>If (i == 0) </a:t>
+            </a:r>
+          </a:p>
+          <a:p>
+            <a:r>
+              <a:rPr lang="hu-HU" dirty="0"/>
               <a:t>{</a:t>
             </a:r>
           </a:p>
           <a:p>
             <a:r>
-              <a:rPr lang="hu-HU" dirty="0" smtClean="0"/>
+              <a:rPr lang="hu-HU" dirty="0"/>
               <a:t>program</a:t>
             </a:r>
           </a:p>
@@ -3393,16 +3349,8 @@
           <a:lstStyle/>
           <a:p>
             <a:r>
-              <a:rPr lang="hu-HU" dirty="0" smtClean="0"/>
-              <a:t>While (i </a:t>
-            </a:r>
-            <a:r>
-              <a:rPr lang="hu-HU" dirty="0"/>
-              <a:t>&lt; </a:t>
-            </a:r>
-            <a:r>
-              <a:rPr lang="hu-HU" dirty="0" smtClean="0"/>
-              <a:t>0)</a:t>
+              <a:rPr lang="hu-HU" dirty="0"/>
+              <a:t>While (i &lt; 0)</a:t>
             </a:r>
           </a:p>
           <a:p>
@@ -3413,7 +3361,7 @@
           </a:p>
           <a:p>
             <a:r>
-              <a:rPr lang="hu-HU" dirty="0" smtClean="0"/>
+              <a:rPr lang="hu-HU" dirty="0"/>
               <a:t>Program</a:t>
             </a:r>
           </a:p>
@@ -3451,18 +3399,14 @@
           <a:lstStyle/>
           <a:p>
             <a:r>
-              <a:rPr lang="hu-HU" dirty="0" smtClean="0"/>
+              <a:rPr lang="hu-HU" dirty="0"/>
               <a:t>Write:</a:t>
             </a:r>
           </a:p>
           <a:p>
             <a:r>
               <a:rPr lang="hu-HU" dirty="0"/>
-              <a:t> </a:t>
-            </a:r>
-            <a:r>
-              <a:rPr lang="hu-HU" dirty="0" smtClean="0"/>
-              <a:t>az eljárás programkódja..</a:t>
+              <a:t> az eljárás programkódja..</a:t>
             </a:r>
           </a:p>
           <a:p>
@@ -3470,10 +3414,9 @@
           </a:p>
           <a:p>
             <a:r>
-              <a:rPr lang="hu-HU" dirty="0" smtClean="0"/>
+              <a:rPr lang="hu-HU" dirty="0"/>
               <a:t>Write (‚alma’)</a:t>
             </a:r>
-            <a:endParaRPr lang="hu-HU" dirty="0"/>
           </a:p>
         </p:txBody>
       </p:sp>
@@ -3500,10 +3443,9 @@
           <a:lstStyle/>
           <a:p>
             <a:r>
-              <a:rPr lang="hu-HU" dirty="0" smtClean="0"/>
+              <a:rPr lang="hu-HU" dirty="0"/>
               <a:t>Int i := -1</a:t>
             </a:r>
-            <a:endParaRPr lang="hu-HU" dirty="0"/>
           </a:p>
         </p:txBody>
       </p:sp>
@@ -3558,16 +3500,10 @@
               <a:lstStyle/>
               <a:p>
                 <a:r>
-                  <a:rPr lang="nn-NO" i="1" dirty="0" smtClean="0">
-                    <a:cs typeface="Courier New" panose="02070309020205020404" pitchFamily="49" charset="0"/>
-                  </a:rPr>
-                  <a:t>int </a:t>
-                </a:r>
-                <a:r>
                   <a:rPr lang="nn-NO" i="1" dirty="0">
                     <a:cs typeface="Courier New" panose="02070309020205020404" pitchFamily="49" charset="0"/>
                   </a:rPr>
-                  <a:t>sum = 0;</a:t>
+                  <a:t>int sum = 0;</a:t>
                 </a:r>
               </a:p>
               <a:p>
@@ -3686,10 +3622,9 @@
             <a:lstStyle/>
             <a:p>
               <a:r>
-                <a:rPr lang="hu-HU" dirty="0" smtClean="0"/>
+                <a:rPr lang="hu-HU" dirty="0"/>
                 <a:t>Fordítóprogram</a:t>
               </a:r>
-              <a:endParaRPr lang="hu-HU" dirty="0"/>
             </a:p>
           </p:txBody>
         </p:sp>
@@ -3825,12 +3760,8 @@
           <a:p>
             <a:pPr algn="ctr"/>
             <a:r>
-              <a:rPr lang="hu-HU" dirty="0" smtClean="0"/>
-              <a:t>Harmadik </a:t>
-            </a:r>
-            <a:r>
-              <a:rPr lang="hu-HU" dirty="0"/>
-              <a:t>lépcső</a:t>
+              <a:rPr lang="hu-HU" dirty="0"/>
+              <a:t>Harmadik lépcső</a:t>
             </a:r>
           </a:p>
         </p:txBody>
@@ -3858,45 +3789,20 @@
           <a:lstStyle/>
           <a:p>
             <a:r>
-              <a:rPr lang="hu-HU" sz="2200" dirty="0" smtClean="0"/>
-              <a:t>Saját </a:t>
-            </a:r>
-            <a:r>
               <a:rPr lang="hu-HU" sz="2200" dirty="0"/>
-              <a:t>típusokat és típusműveleteket adhatok meg: pl: autó, mint típus, melynek egy típusművelete lehet pl az, hogy autó </a:t>
-            </a:r>
-            <a:r>
-              <a:rPr lang="hu-HU" sz="2200" dirty="0" smtClean="0"/>
-              <a:t>beindítása</a:t>
+              <a:t>Saját típusokat és típusműveleteket adhatok meg: pl: autó, mint típus, melynek egy típusművelete lehet pl az, hogy autó beindítása</a:t>
             </a:r>
           </a:p>
           <a:p>
             <a:r>
               <a:rPr lang="hu-HU" sz="2200" dirty="0"/>
-              <a:t>Ez alatt strukturákat kell érteni (pl. </a:t>
-            </a:r>
-            <a:r>
-              <a:rPr lang="hu-HU" sz="2200" dirty="0" smtClean="0"/>
-              <a:t>Ha emberek adatait szeretnék tárolni összefogjuk egy struktúrába</a:t>
-            </a:r>
+              <a:t>Ez alatt strukturákat kell érteni (pl. Ha emberek adatait szeretnék tárolni összefogjuk egy struktúrába, így a kódban egységesen tudjuk kezelni őket )</a:t>
+            </a:r>
+          </a:p>
+          <a:p>
             <a:r>
               <a:rPr lang="hu-HU" sz="2200" dirty="0"/>
-              <a:t>, így a kódban egységesen tudjuk kezelni őket </a:t>
-            </a:r>
-            <a:r>
-              <a:rPr lang="hu-HU" sz="2200" dirty="0" smtClean="0"/>
-              <a:t>)</a:t>
-            </a:r>
-            <a:endParaRPr lang="hu-HU" sz="2200" dirty="0"/>
-          </a:p>
-          <a:p>
-            <a:r>
-              <a:rPr lang="hu-HU" sz="2200" dirty="0"/>
-              <a:t>Absztrakció: Egyre jobban ki tudom fejezni a modellezett fogalmakat a programban, pl. egy autós játékban a programkódban meg fog jelenni az autó entitás, és a játékos által vezérzet műveletek pedig meg fognak jelenni típusműveletként</a:t>
-            </a:r>
-            <a:r>
-              <a:rPr lang="hu-HU" sz="2200" dirty="0" smtClean="0"/>
-              <a:t>. (Ilyen nyelvek pl. C++, Java, C#)</a:t>
+              <a:t>Absztrakció: Egyre jobban ki tudom fejezni a modellezett fogalmakat a programban, pl. egy autós játékban a programkódban meg fog jelenni az autó entitás, és a játékos által vezérzet műveletek pedig meg fognak jelenni típusműveletként. (Ilyen nyelvek pl. C++, Java, C#)</a:t>
             </a:r>
           </a:p>
         </p:txBody>
@@ -3924,36 +3830,28 @@
           <a:lstStyle/>
           <a:p>
             <a:r>
-              <a:rPr lang="hu-HU" sz="2000" dirty="0" smtClean="0"/>
+              <a:rPr lang="hu-HU" sz="2000" dirty="0"/>
               <a:t>class Auto {</a:t>
             </a:r>
           </a:p>
           <a:p>
             <a:r>
               <a:rPr lang="hu-HU" sz="2000" dirty="0"/>
-              <a:t>v</a:t>
-            </a:r>
-            <a:r>
-              <a:rPr lang="hu-HU" sz="2000" dirty="0" smtClean="0"/>
-              <a:t>oid beindit() {def..}</a:t>
-            </a:r>
-          </a:p>
-          <a:p>
-            <a:endParaRPr lang="hu-HU" sz="2000" dirty="0" smtClean="0"/>
+              <a:t>void beindit() {def..}</a:t>
+            </a:r>
+          </a:p>
+          <a:p>
+            <a:endParaRPr lang="hu-HU" sz="2000" dirty="0"/>
           </a:p>
           <a:p>
             <a:r>
               <a:rPr lang="hu-HU" sz="2000" dirty="0"/>
-              <a:t>e</a:t>
-            </a:r>
-            <a:r>
-              <a:rPr lang="hu-HU" sz="2000" dirty="0" smtClean="0"/>
-              <a:t>gyeb valtozok, melyek reprezentaljak az autot..</a:t>
-            </a:r>
-          </a:p>
-          <a:p>
-            <a:r>
-              <a:rPr lang="hu-HU" sz="2000" dirty="0" smtClean="0"/>
+              <a:t>egyeb valtozok, melyek reprezentaljak az autot..</a:t>
+            </a:r>
+          </a:p>
+          <a:p>
+            <a:r>
+              <a:rPr lang="hu-HU" sz="2000" dirty="0"/>
               <a:t>};</a:t>
             </a:r>
           </a:p>
@@ -3962,22 +3860,14 @@
           </a:p>
           <a:p>
             <a:r>
-              <a:rPr lang="hu-HU" sz="2000" dirty="0" smtClean="0"/>
-              <a:t>Auto </a:t>
-            </a:r>
-            <a:r>
               <a:rPr lang="hu-HU" sz="2000" dirty="0"/>
-              <a:t>auto(‚Ford’);</a:t>
+              <a:t>Auto auto(‚Ford’);</a:t>
             </a:r>
           </a:p>
           <a:p>
             <a:r>
               <a:rPr lang="hu-HU" sz="2000" dirty="0"/>
-              <a:t>auto.beindit</a:t>
-            </a:r>
-            <a:r>
-              <a:rPr lang="hu-HU" sz="2000" dirty="0" smtClean="0"/>
-              <a:t>();</a:t>
+              <a:t>auto.beindit();</a:t>
             </a:r>
           </a:p>
           <a:p>
@@ -4009,31 +3899,26 @@
           <a:p>
             <a:r>
               <a:rPr lang="hu-HU" dirty="0"/>
-              <a:t>s</a:t>
-            </a:r>
-            <a:r>
-              <a:rPr lang="hu-HU" dirty="0" smtClean="0"/>
-              <a:t>truct Ember {</a:t>
-            </a:r>
-          </a:p>
-          <a:p>
-            <a:r>
-              <a:rPr lang="hu-HU" dirty="0" smtClean="0"/>
+              <a:t>struct Ember {</a:t>
+            </a:r>
+          </a:p>
+          <a:p>
+            <a:r>
+              <a:rPr lang="hu-HU" dirty="0"/>
               <a:t>String nev;</a:t>
             </a:r>
           </a:p>
           <a:p>
             <a:r>
-              <a:rPr lang="hu-HU" dirty="0" smtClean="0"/>
+              <a:rPr lang="hu-HU" dirty="0"/>
               <a:t>Int kor;</a:t>
             </a:r>
           </a:p>
           <a:p>
             <a:r>
-              <a:rPr lang="hu-HU" dirty="0" smtClean="0"/>
+              <a:rPr lang="hu-HU" dirty="0"/>
               <a:t>};</a:t>
             </a:r>
-            <a:endParaRPr lang="hu-HU" dirty="0"/>
           </a:p>
         </p:txBody>
       </p:sp>
@@ -4125,63 +4010,44 @@
           <a:p>
             <a:r>
               <a:rPr lang="hu-HU" dirty="0"/>
-              <a:t>Építsük fel a programkód vázát program </a:t>
-            </a:r>
-            <a:r>
-              <a:rPr lang="hu-HU" dirty="0" smtClean="0"/>
-              <a:t>modellel</a:t>
-            </a:r>
-            <a:endParaRPr lang="hu-HU" dirty="0"/>
-          </a:p>
-          <a:p>
-            <a:r>
-              <a:rPr lang="hu-HU" dirty="0" smtClean="0"/>
+              <a:t>Építsük fel a programkód vázát program modellel</a:t>
+            </a:r>
+          </a:p>
+          <a:p>
+            <a:r>
+              <a:rPr lang="hu-HU" dirty="0"/>
               <a:t>Mi a program modell?</a:t>
             </a:r>
           </a:p>
           <a:p>
             <a:r>
-              <a:rPr lang="hu-HU" dirty="0" smtClean="0"/>
+              <a:rPr lang="hu-HU" dirty="0"/>
               <a:t>Analóg példa: Építészmérnök készít egy tervrajzot, a kivitelező pedig felépíti azt a tervrajz alapján</a:t>
             </a:r>
           </a:p>
           <a:p>
             <a:r>
-              <a:rPr lang="hu-HU" dirty="0" smtClean="0"/>
+              <a:rPr lang="hu-HU" dirty="0"/>
               <a:t>Programozásban is tudunk tervezni, bár ez néha elmarad</a:t>
             </a:r>
           </a:p>
           <a:p>
             <a:r>
-              <a:rPr lang="hu-HU" dirty="0" smtClean="0"/>
-              <a:t>A tervező készít egy grafikus rajzot a program várázól, a kivitelező, </a:t>
-            </a:r>
-            <a:r>
-              <a:rPr lang="hu-HU" dirty="0" smtClean="0"/>
-              <a:t>kódoló </a:t>
-            </a:r>
-            <a:r>
-              <a:rPr lang="hu-HU" dirty="0" smtClean="0"/>
-              <a:t>pedig az alapján fog dolgozni..</a:t>
-            </a:r>
-          </a:p>
-          <a:p>
-            <a:r>
-              <a:rPr lang="hu-HU" dirty="0" smtClean="0"/>
+              <a:rPr lang="hu-HU" dirty="0"/>
+              <a:t>A tervező készít egy grafikus rajzot a program várázól, a kivitelező, kódoló pedig az alapján fog dolgozni..</a:t>
+            </a:r>
+          </a:p>
+          <a:p>
+            <a:r>
+              <a:rPr lang="hu-HU" dirty="0"/>
               <a:t>Az absztrakció itt abban van, hogy a tervrajz teljesen nyelvüfggettlen, nagyon jól átlátható, könnyen érhető, közel áll az emberi gondolkodáshoz. </a:t>
             </a:r>
-            <a:endParaRPr lang="hu-HU" dirty="0"/>
-          </a:p>
-          <a:p>
-            <a:r>
-              <a:rPr lang="hu-HU" dirty="0" smtClean="0"/>
-              <a:t>Ezen a szinten nem foglalkozunk programozási nyelvekkel, kódokkal, ezeket elhanyagoljunk, a lényeg a modellezet fogalmakon </a:t>
-            </a:r>
-            <a:r>
-              <a:rPr lang="hu-HU" dirty="0" smtClean="0"/>
-              <a:t>van (pl. Az auton)</a:t>
-            </a:r>
-            <a:endParaRPr lang="hu-HU" dirty="0"/>
+          </a:p>
+          <a:p>
+            <a:r>
+              <a:rPr lang="hu-HU" dirty="0"/>
+              <a:t>Ezen a szinten nem foglalkozunk programozási nyelvekkel, kódokkal, ezeket elhanyagoljunk, a lényeg a modellezet fogalmakon van (pl. Az auton)</a:t>
+            </a:r>
           </a:p>
           <a:p>
             <a:endParaRPr lang="hu-HU" dirty="0"/>
@@ -4246,10 +4112,9 @@
           <a:p>
             <a:pPr algn="ctr"/>
             <a:r>
-              <a:rPr lang="hu-HU" dirty="0" smtClean="0"/>
+              <a:rPr lang="hu-HU" dirty="0"/>
               <a:t>Példa egy tervre</a:t>
             </a:r>
-            <a:endParaRPr lang="hu-HU" dirty="0"/>
           </a:p>
         </p:txBody>
       </p:sp>
@@ -4336,10 +4201,9 @@
           <a:lstStyle/>
           <a:p>
             <a:r>
-              <a:rPr lang="hu-HU" sz="2000" dirty="0" smtClean="0"/>
+              <a:rPr lang="hu-HU" sz="2000" dirty="0"/>
               <a:t>Programváz</a:t>
             </a:r>
-            <a:endParaRPr lang="hu-HU" sz="2000" dirty="0"/>
           </a:p>
         </p:txBody>
       </p:sp>
@@ -4366,10 +4230,9 @@
           <a:lstStyle/>
           <a:p>
             <a:r>
-              <a:rPr lang="hu-HU" sz="2000" dirty="0" smtClean="0"/>
+              <a:rPr lang="hu-HU" sz="2000" dirty="0"/>
               <a:t>Program működést is tervezhetünk</a:t>
             </a:r>
-            <a:endParaRPr lang="hu-HU" sz="2000" dirty="0"/>
           </a:p>
         </p:txBody>
       </p:sp>
@@ -4420,10 +4283,9 @@
           <a:p>
             <a:pPr algn="ctr"/>
             <a:r>
-              <a:rPr lang="hu-HU" dirty="0" smtClean="0"/>
+              <a:rPr lang="hu-HU" dirty="0"/>
               <a:t>Végrehajtható terv</a:t>
             </a:r>
-            <a:endParaRPr lang="hu-HU" dirty="0"/>
           </a:p>
         </p:txBody>
       </p:sp>
@@ -4448,31 +4310,23 @@
           <a:lstStyle/>
           <a:p>
             <a:r>
-              <a:rPr lang="hu-HU" dirty="0" smtClean="0"/>
-              <a:t>Egy jól definiált leíró nyelvvel azonban a tervet végre tudjuk hajtani, </a:t>
-            </a:r>
-            <a:r>
-              <a:rPr lang="hu-HU" dirty="0" smtClean="0"/>
-              <a:t>tesztelni </a:t>
-            </a:r>
-            <a:r>
-              <a:rPr lang="hu-HU" dirty="0" smtClean="0"/>
-              <a:t>tudjuk</a:t>
-            </a:r>
-          </a:p>
-          <a:p>
-            <a:r>
-              <a:rPr lang="hu-HU" dirty="0" smtClean="0"/>
+              <a:rPr lang="hu-HU" dirty="0"/>
+              <a:t>Egy jól definiált leíró nyelvvel azonban a tervet végre tudjuk hajtani, tesztelni tudjuk</a:t>
+            </a:r>
+          </a:p>
+          <a:p>
+            <a:r>
+              <a:rPr lang="hu-HU" dirty="0"/>
               <a:t>Hogyan?</a:t>
             </a:r>
           </a:p>
           <a:p>
             <a:r>
-              <a:rPr lang="hu-HU" dirty="0" smtClean="0"/>
+              <a:rPr lang="hu-HU" dirty="0"/>
               <a:t>Hát egy programmal! </a:t>
             </a:r>
             <a:r>
-              <a:rPr lang="hu-HU" dirty="0" smtClean="0">
+              <a:rPr lang="hu-HU" dirty="0">
                 <a:sym typeface="Wingdings" panose="05000000000000000000" pitchFamily="2" charset="2"/>
               </a:rPr>
               <a:t> Általánosságban két lehetőségünk van rá.</a:t>
@@ -4484,7 +4338,7 @@
               <a:buAutoNum type="arabicPeriod"/>
             </a:pPr>
             <a:r>
-              <a:rPr lang="hu-HU" dirty="0" smtClean="0">
+              <a:rPr lang="hu-HU" dirty="0">
                 <a:sym typeface="Wingdings" panose="05000000000000000000" pitchFamily="2" charset="2"/>
               </a:rPr>
               <a:t>Lefordítjuk a tervet egy megfelelő célnyelvre, pl c++-ra. (lényegében ez is egy fordítóprogram)</a:t>
@@ -4499,21 +4353,14 @@
               <a:rPr lang="hu-HU" dirty="0">
                 <a:sym typeface="Wingdings" panose="05000000000000000000" pitchFamily="2" charset="2"/>
               </a:rPr>
-              <a:t>Í</a:t>
-            </a:r>
-            <a:r>
-              <a:rPr lang="hu-HU" dirty="0" smtClean="0">
-                <a:sym typeface="Wingdings" panose="05000000000000000000" pitchFamily="2" charset="2"/>
-              </a:rPr>
-              <a:t>runk egy saját „virtuális gépet” (egy végrehajtó programot), melynek a nyelve nem bináris kód, hanem a tervben szereplő leíróelemek</a:t>
-            </a:r>
-          </a:p>
-          <a:p>
-            <a:r>
-              <a:rPr lang="hu-HU" dirty="0" smtClean="0"/>
+              <a:t>Írunk egy saját „virtuális gépet” (egy végrehajtó programot), melynek a nyelve nem bináris kód, hanem a tervben szereplő leíróelemek</a:t>
+            </a:r>
+          </a:p>
+          <a:p>
+            <a:r>
+              <a:rPr lang="hu-HU" dirty="0"/>
               <a:t>Kutatási terület, nem kiforrott..</a:t>
             </a:r>
-            <a:endParaRPr lang="hu-HU" dirty="0"/>
           </a:p>
         </p:txBody>
       </p:sp>
@@ -4564,10 +4411,9 @@
           <a:p>
             <a:pPr algn="ctr"/>
             <a:r>
-              <a:rPr lang="hu-HU" dirty="0" smtClean="0"/>
+              <a:rPr lang="hu-HU" dirty="0"/>
               <a:t>Zárógondolat</a:t>
             </a:r>
-            <a:endParaRPr lang="hu-HU" dirty="0"/>
           </a:p>
         </p:txBody>
       </p:sp>
@@ -4589,57 +4435,39 @@
           <a:lstStyle/>
           <a:p>
             <a:r>
-              <a:rPr lang="hu-HU" dirty="0" smtClean="0"/>
+              <a:rPr lang="hu-HU" dirty="0"/>
               <a:t>Bármikor saját absztrakt nyelv készíthető</a:t>
             </a:r>
           </a:p>
           <a:p>
             <a:r>
-              <a:rPr lang="hu-HU" dirty="0" smtClean="0"/>
+              <a:rPr lang="hu-HU" dirty="0"/>
               <a:t>Mi határozzuk meg a nyelv utasításkészletét</a:t>
             </a:r>
           </a:p>
           <a:p>
             <a:r>
-              <a:rPr lang="hu-HU" dirty="0" smtClean="0"/>
-              <a:t>Gondoskodnunk kell arról, hogy az utasításokat végre tudjuk hajtani, pl. </a:t>
-            </a:r>
-            <a:r>
-              <a:rPr lang="hu-HU" dirty="0"/>
-              <a:t>e</a:t>
-            </a:r>
-            <a:r>
-              <a:rPr lang="hu-HU" dirty="0" smtClean="0"/>
-              <a:t>gy fordítóprogram írásával</a:t>
-            </a:r>
-          </a:p>
-          <a:p>
-            <a:r>
-              <a:rPr lang="hu-HU" dirty="0" smtClean="0"/>
+              <a:rPr lang="hu-HU" dirty="0"/>
+              <a:t>Gondoskodnunk kell arról, hogy az utasításokat végre tudjuk hajtani, pl. egy fordítóprogram írásával</a:t>
+            </a:r>
+          </a:p>
+          <a:p>
+            <a:r>
+              <a:rPr lang="hu-HU" dirty="0"/>
               <a:t>Illetve fel lehet használni meglévő techonológiákat, és arra építkezni (a fordítóprogramok is ezt teszik az assembly-vel)</a:t>
             </a:r>
           </a:p>
           <a:p>
             <a:r>
-              <a:rPr lang="hu-HU" dirty="0" smtClean="0"/>
-              <a:t>A nyelvnek nem muszáj általános célú nyelvnek lennie (Nem biztos, hogy mindent ki tudok fejezni </a:t>
-            </a:r>
-            <a:r>
-              <a:rPr lang="hu-HU" dirty="0" smtClean="0"/>
-              <a:t>vele, pl. Lehet egy robot irányítása tervezem, fel, le, jobbra, blra utasításokkal)</a:t>
-            </a:r>
-            <a:endParaRPr lang="hu-HU" dirty="0" smtClean="0"/>
-          </a:p>
-          <a:p>
-            <a:r>
-              <a:rPr lang="hu-HU" dirty="0" smtClean="0"/>
-              <a:t>ELTÉ-n lehet tanulni fordítóprogramokról</a:t>
-            </a:r>
-            <a:r>
-              <a:rPr lang="hu-HU" dirty="0" smtClean="0"/>
-              <a:t>..</a:t>
-            </a:r>
-            <a:endParaRPr lang="hu-HU" dirty="0"/>
+              <a:rPr lang="hu-HU" dirty="0"/>
+              <a:t>A nyelvnek nem muszáj általános célú nyelvnek lennie (Nem biztos, hogy mindent ki tudok fejezni vele, pl. Lehet egy robot irányítása tervezem, fel, le, jobbra, blra utasításokkal)</a:t>
+            </a:r>
+          </a:p>
+          <a:p>
+            <a:r>
+              <a:rPr lang="hu-HU" dirty="0"/>
+              <a:t>ELTÉ-n lehet tanulni fordítóprogramokról..</a:t>
+            </a:r>
           </a:p>
         </p:txBody>
       </p:sp>
@@ -4697,10 +4525,9 @@
           <a:p>
             <a:pPr algn="ctr"/>
             <a:r>
-              <a:rPr lang="hu-HU" sz="6600" dirty="0" smtClean="0"/>
+              <a:rPr lang="hu-HU" sz="6600" dirty="0"/>
               <a:t>Köszönöm a figyelmet!</a:t>
             </a:r>
-            <a:endParaRPr lang="hu-HU" sz="6600" dirty="0"/>
           </a:p>
         </p:txBody>
       </p:sp>
@@ -4730,7 +4557,7 @@
               <a:buNone/>
             </a:pPr>
             <a:r>
-              <a:rPr lang="hu-HU" sz="4000" dirty="0" smtClean="0"/>
+              <a:rPr lang="hu-HU" sz="4000" dirty="0"/>
               <a:t>Kérdések..</a:t>
             </a:r>
           </a:p>
@@ -4759,29 +4586,28 @@
           <a:lstStyle/>
           <a:p>
             <a:r>
-              <a:rPr lang="hu-HU" sz="2800" dirty="0" smtClean="0"/>
+              <a:rPr lang="hu-HU" sz="2800" dirty="0"/>
               <a:t>Elérhetőség: </a:t>
             </a:r>
           </a:p>
           <a:p>
             <a:r>
-              <a:rPr lang="hu-HU" sz="2000" dirty="0" smtClean="0"/>
+              <a:rPr lang="hu-HU" sz="2000" dirty="0"/>
               <a:t>email: </a:t>
             </a:r>
             <a:r>
-              <a:rPr lang="hu-HU" sz="2000" i="1" dirty="0" smtClean="0">
+              <a:rPr lang="hu-HU" sz="2000" i="1" dirty="0">
                 <a:hlinkClick r:id="rId2"/>
               </a:rPr>
               <a:t>nagy.andras95@gmail.com</a:t>
             </a:r>
-            <a:endParaRPr lang="hu-HU" sz="2000" i="1" dirty="0" smtClean="0"/>
-          </a:p>
-          <a:p>
-            <a:r>
-              <a:rPr lang="hu-HU" sz="2000" dirty="0" smtClean="0"/>
+            <a:endParaRPr lang="hu-HU" sz="2000" i="1" dirty="0"/>
+          </a:p>
+          <a:p>
+            <a:r>
+              <a:rPr lang="hu-HU" sz="2000" dirty="0"/>
               <a:t>Finna Imola tanárnőn keresztül..</a:t>
             </a:r>
-            <a:endParaRPr lang="hu-HU" sz="2000" dirty="0"/>
           </a:p>
         </p:txBody>
       </p:sp>
@@ -4901,15 +4727,7 @@
           <a:p>
             <a:r>
               <a:rPr lang="hu-HU" dirty="0"/>
-              <a:t>Mindkettő egy-egy absztrakcióval foglalkozik (magas szintű programozási nyelvek, </a:t>
-            </a:r>
-            <a:r>
-              <a:rPr lang="hu-HU" dirty="0" smtClean="0"/>
-              <a:t>végrehajtható </a:t>
-            </a:r>
-            <a:r>
-              <a:rPr lang="hu-HU" dirty="0"/>
-              <a:t>modellezés), így ez ihlette meg az előadás témáját</a:t>
+              <a:t>Mindkettő egy-egy absztrakcióval foglalkozik (magas szintű programozási nyelvek, végrehajtható modellezés), így ez ihlette meg az előadás témáját</a:t>
             </a:r>
           </a:p>
         </p:txBody>
@@ -5269,13 +5087,13 @@
               <a:t> első bájt a mozgatás utasítás, a második pedig a </a:t>
             </a:r>
             <a:r>
-              <a:rPr lang="hu-HU" altLang="hu-HU" dirty="0" smtClean="0">
+              <a:rPr lang="hu-HU" altLang="hu-HU" dirty="0">
                 <a:latin typeface="Arial" panose="020B0604020202020204" pitchFamily="34" charset="0"/>
               </a:rPr>
               <a:t>10</a:t>
             </a:r>
             <a:r>
-              <a:rPr kumimoji="0" lang="hu-HU" altLang="hu-HU" b="0" i="0" u="none" strike="noStrike" cap="none" normalizeH="0" dirty="0" smtClean="0">
+              <a:rPr kumimoji="0" lang="hu-HU" altLang="hu-HU" b="0" i="0" u="none" strike="noStrike" cap="none" normalizeH="0" dirty="0">
                 <a:ln>
                   <a:noFill/>
                 </a:ln>
@@ -5287,16 +5105,6 @@
               </a:rPr>
               <a:t>-es érték binárisan felírva 1 bájton.</a:t>
             </a:r>
-            <a:endParaRPr kumimoji="0" lang="hu-HU" altLang="hu-HU" b="0" i="0" u="none" strike="noStrike" cap="none" normalizeH="0" dirty="0">
-              <a:ln>
-                <a:noFill/>
-              </a:ln>
-              <a:solidFill>
-                <a:schemeClr val="tx1"/>
-              </a:solidFill>
-              <a:effectLst/>
-              <a:latin typeface="Arial" panose="020B0604020202020204" pitchFamily="34" charset="0"/>
-            </a:endParaRPr>
           </a:p>
           <a:p>
             <a:pPr lvl="0"/>
@@ -5310,19 +5118,7 @@
               <a:rPr lang="hu-HU" altLang="hu-HU" dirty="0">
                 <a:latin typeface="Arial" panose="020B0604020202020204" pitchFamily="34" charset="0"/>
               </a:rPr>
-              <a:t> </a:t>
-            </a:r>
-            <a:r>
-              <a:rPr lang="hu-HU" altLang="hu-HU" dirty="0" smtClean="0">
-                <a:latin typeface="Arial" panose="020B0604020202020204" pitchFamily="34" charset="0"/>
-              </a:rPr>
-              <a:t>sorozatát </a:t>
-            </a:r>
-            <a:r>
-              <a:rPr lang="hu-HU" altLang="hu-HU" dirty="0">
-                <a:latin typeface="Arial" panose="020B0604020202020204" pitchFamily="34" charset="0"/>
-              </a:rPr>
-              <a:t>pedig programnak nevezzük</a:t>
+              <a:t> sorozatát pedig programnak nevezzük</a:t>
             </a:r>
             <a:endParaRPr kumimoji="0" lang="hu-HU" altLang="hu-HU" b="0" i="0" u="none" strike="noStrike" cap="none" normalizeH="0" baseline="0" dirty="0">
               <a:ln>
@@ -5384,10 +5180,9 @@
           <a:p>
             <a:pPr algn="ctr"/>
             <a:r>
-              <a:rPr lang="hu-HU" dirty="0" smtClean="0"/>
+              <a:rPr lang="hu-HU" dirty="0"/>
               <a:t>Információs rendszerek táblázat </a:t>
             </a:r>
-            <a:endParaRPr lang="hu-HU" dirty="0"/>
           </a:p>
         </p:txBody>
       </p:sp>
@@ -5446,11 +5241,11 @@
                     <a:lstStyle/>
                     <a:p>
                       <a:r>
-                        <a:rPr lang="hu-HU" dirty="0" smtClean="0"/>
+                        <a:rPr lang="hu-HU" dirty="0"/>
                         <a:t>Fő Informáci</a:t>
                       </a:r>
                       <a:r>
-                        <a:rPr lang="hu-HU" baseline="0" dirty="0" smtClean="0"/>
+                        <a:rPr lang="hu-HU" baseline="0" dirty="0"/>
                         <a:t>ó Fajták</a:t>
                       </a:r>
                       <a:endParaRPr lang="hu-HU" dirty="0"/>
@@ -5464,10 +5259,9 @@
                     <a:lstStyle/>
                     <a:p>
                       <a:r>
-                        <a:rPr lang="hu-HU" dirty="0" smtClean="0"/>
+                        <a:rPr lang="hu-HU" dirty="0"/>
                         <a:t>Jelek száma</a:t>
                       </a:r>
-                      <a:endParaRPr lang="hu-HU" dirty="0"/>
                     </a:p>
                   </a:txBody>
                   <a:tcPr/>
@@ -5478,10 +5272,9 @@
                     <a:lstStyle/>
                     <a:p>
                       <a:r>
-                        <a:rPr lang="hu-HU" dirty="0" smtClean="0"/>
+                        <a:rPr lang="hu-HU" dirty="0"/>
                         <a:t>Mihez kell?</a:t>
                       </a:r>
-                      <a:endParaRPr lang="hu-HU" dirty="0"/>
                     </a:p>
                   </a:txBody>
                   <a:tcPr/>
@@ -5499,11 +5292,11 @@
                     <a:lstStyle/>
                     <a:p>
                       <a:r>
-                        <a:rPr lang="hu-HU" dirty="0" smtClean="0"/>
+                        <a:rPr lang="hu-HU" dirty="0"/>
                         <a:t>Genetikai</a:t>
                       </a:r>
                       <a:r>
-                        <a:rPr lang="hu-HU" baseline="0" dirty="0" smtClean="0"/>
+                        <a:rPr lang="hu-HU" baseline="0" dirty="0"/>
                         <a:t> információ</a:t>
                       </a:r>
                       <a:endParaRPr lang="hu-HU" dirty="0"/>
@@ -5517,10 +5310,9 @@
                     <a:lstStyle/>
                     <a:p>
                       <a:r>
-                        <a:rPr lang="hu-HU" dirty="0" smtClean="0"/>
+                        <a:rPr lang="hu-HU" dirty="0"/>
                         <a:t> 4 (A,T,G,C)</a:t>
                       </a:r>
-                      <a:endParaRPr lang="hu-HU" dirty="0"/>
                     </a:p>
                   </a:txBody>
                   <a:tcPr/>
@@ -5531,10 +5323,9 @@
                     <a:lstStyle/>
                     <a:p>
                       <a:r>
-                        <a:rPr lang="hu-HU" dirty="0" smtClean="0"/>
+                        <a:rPr lang="hu-HU" dirty="0"/>
                         <a:t>Élet</a:t>
                       </a:r>
-                      <a:endParaRPr lang="hu-HU" dirty="0"/>
                     </a:p>
                   </a:txBody>
                   <a:tcPr/>
@@ -5552,10 +5343,9 @@
                     <a:lstStyle/>
                     <a:p>
                       <a:r>
-                        <a:rPr lang="hu-HU" dirty="0" smtClean="0"/>
+                        <a:rPr lang="hu-HU" dirty="0"/>
                         <a:t>Beszéd</a:t>
                       </a:r>
-                      <a:endParaRPr lang="hu-HU" dirty="0"/>
                     </a:p>
                   </a:txBody>
                   <a:tcPr/>
@@ -5566,10 +5356,9 @@
                     <a:lstStyle/>
                     <a:p>
                       <a:r>
-                        <a:rPr lang="hu-HU" dirty="0" smtClean="0"/>
+                        <a:rPr lang="hu-HU" dirty="0"/>
                         <a:t>30-50 (hangok)</a:t>
                       </a:r>
-                      <a:endParaRPr lang="hu-HU" dirty="0"/>
                     </a:p>
                   </a:txBody>
                   <a:tcPr/>
@@ -5580,10 +5369,9 @@
                     <a:lstStyle/>
                     <a:p>
                       <a:r>
-                        <a:rPr lang="hu-HU" dirty="0" smtClean="0"/>
+                        <a:rPr lang="hu-HU" dirty="0"/>
                         <a:t>Emberi közösség</a:t>
                       </a:r>
-                      <a:endParaRPr lang="hu-HU" dirty="0"/>
                     </a:p>
                   </a:txBody>
                   <a:tcPr/>
@@ -5601,10 +5389,9 @@
                     <a:lstStyle/>
                     <a:p>
                       <a:r>
-                        <a:rPr lang="hu-HU" dirty="0" smtClean="0"/>
+                        <a:rPr lang="hu-HU" dirty="0"/>
                         <a:t>Írás</a:t>
                       </a:r>
-                      <a:endParaRPr lang="hu-HU" dirty="0"/>
                     </a:p>
                   </a:txBody>
                   <a:tcPr/>
@@ -5615,11 +5402,11 @@
                     <a:lstStyle/>
                     <a:p>
                       <a:r>
-                        <a:rPr lang="hu-HU" dirty="0" smtClean="0"/>
+                        <a:rPr lang="hu-HU" dirty="0"/>
                         <a:t>30-40</a:t>
                       </a:r>
                       <a:r>
-                        <a:rPr lang="hu-HU" baseline="0" dirty="0" smtClean="0"/>
+                        <a:rPr lang="hu-HU" baseline="0" dirty="0"/>
                         <a:t> betű</a:t>
                       </a:r>
                       <a:endParaRPr lang="hu-HU" dirty="0"/>
@@ -5633,10 +5420,9 @@
                     <a:lstStyle/>
                     <a:p>
                       <a:r>
-                        <a:rPr lang="hu-HU" dirty="0" smtClean="0"/>
+                        <a:rPr lang="hu-HU" dirty="0"/>
                         <a:t>Államszervezet</a:t>
                       </a:r>
-                      <a:endParaRPr lang="hu-HU" dirty="0"/>
                     </a:p>
                   </a:txBody>
                   <a:tcPr/>
@@ -5654,10 +5440,9 @@
                     <a:lstStyle/>
                     <a:p>
                       <a:r>
-                        <a:rPr lang="hu-HU" dirty="0" smtClean="0"/>
+                        <a:rPr lang="hu-HU" dirty="0"/>
                         <a:t>Számítógép</a:t>
                       </a:r>
-                      <a:endParaRPr lang="hu-HU" dirty="0"/>
                     </a:p>
                   </a:txBody>
                   <a:tcPr/>
@@ -5668,10 +5453,9 @@
                     <a:lstStyle/>
                     <a:p>
                       <a:r>
-                        <a:rPr lang="hu-HU" dirty="0" smtClean="0"/>
+                        <a:rPr lang="hu-HU" dirty="0"/>
                         <a:t>2 (0,1)</a:t>
                       </a:r>
-                      <a:endParaRPr lang="hu-HU" dirty="0"/>
                     </a:p>
                   </a:txBody>
                   <a:tcPr/>
@@ -5682,10 +5466,9 @@
                     <a:lstStyle/>
                     <a:p>
                       <a:r>
-                        <a:rPr lang="hu-HU" dirty="0" smtClean="0"/>
+                        <a:rPr lang="hu-HU" dirty="0"/>
                         <a:t>Modern társadalom</a:t>
                       </a:r>
-                      <a:endParaRPr lang="hu-HU" dirty="0"/>
                     </a:p>
                   </a:txBody>
                   <a:tcPr/>
@@ -5723,22 +5506,17 @@
           <a:lstStyle/>
           <a:p>
             <a:r>
-              <a:rPr lang="hu-HU" dirty="0" smtClean="0"/>
+              <a:rPr lang="hu-HU" dirty="0"/>
               <a:t>Forrás: </a:t>
             </a:r>
             <a:r>
               <a:rPr lang="nb-NO" dirty="0"/>
-              <a:t>I. N. Smertele </a:t>
-            </a:r>
-            <a:r>
-              <a:rPr lang="nb-NO" dirty="0" smtClean="0"/>
-              <a:t>– </a:t>
-            </a:r>
-            <a:r>
-              <a:rPr lang="hu-HU" dirty="0" smtClean="0"/>
+              <a:t>I. N. Smertele – </a:t>
+            </a:r>
+            <a:r>
+              <a:rPr lang="hu-HU" dirty="0"/>
               <a:t>Az élet alapkérdései</a:t>
             </a:r>
-            <a:endParaRPr lang="hu-HU" dirty="0"/>
           </a:p>
         </p:txBody>
       </p:sp>
@@ -5790,7 +5568,7 @@
             <a:pPr algn="ctr"/>
             <a:r>
               <a:rPr lang="hu-HU" dirty="0"/>
-              <a:t>Programozni = bináris szorozatot írni?</a:t>
+              <a:t>Programozni = bináris sorozatot írni?</a:t>
             </a:r>
           </a:p>
         </p:txBody>
@@ -6081,10 +5859,9 @@
           <a:lstStyle/>
           <a:p>
             <a:r>
-              <a:rPr lang="hu-HU" dirty="0" smtClean="0"/>
+              <a:rPr lang="hu-HU" dirty="0"/>
               <a:t>Példa forrás: Dévai Gergely – Fordítóprogramok bevezető előadás</a:t>
             </a:r>
-            <a:endParaRPr lang="hu-HU" dirty="0"/>
           </a:p>
         </p:txBody>
       </p:sp>
@@ -6166,7 +5943,7 @@
           <a:p>
             <a:r>
               <a:rPr lang="hu-HU" dirty="0"/>
-              <a:t>Egyel magasabb absztrakciós szint: Minek jegyezzek meg számokat, amikor neveket egyszerűbb..</a:t>
+              <a:t>Eggyel magasabb absztrakciós szint: Minek jegyezzek meg számokat, amikor neveket egyszerűbb..</a:t>
             </a:r>
           </a:p>
           <a:p>
@@ -6243,13 +6020,8 @@
             <a:pPr algn="ctr"/>
             <a:r>
               <a:rPr lang="hu-HU" dirty="0"/>
-              <a:t>Második </a:t>
-            </a:r>
-            <a:r>
-              <a:rPr lang="hu-HU" dirty="0" smtClean="0"/>
-              <a:t>lépcső: Magasabb szintű nyelvek</a:t>
-            </a:r>
-            <a:endParaRPr lang="hu-HU" dirty="0"/>
+              <a:t>Második lépcső: Magasabb szintű nyelvek</a:t>
+            </a:r>
           </a:p>
         </p:txBody>
       </p:sp>
@@ -6275,19 +6047,14 @@
           <a:p>
             <a:r>
               <a:rPr lang="hu-HU" dirty="0"/>
-              <a:t>Assembly-re könnyebb fordítani, mint közvetlen gép kódra (mivel már eggyel magasabb szintű absztrakció)</a:t>
-            </a:r>
-          </a:p>
-          <a:p>
-            <a:r>
-              <a:rPr lang="hu-HU" dirty="0"/>
-              <a:t>Így a „magasabb szintű” nyelvek már csak arra fordulnak</a:t>
-            </a:r>
-            <a:r>
-              <a:rPr lang="hu-HU" dirty="0" smtClean="0"/>
-              <a:t>. (C, Fortan)</a:t>
-            </a:r>
-            <a:endParaRPr lang="hu-HU" dirty="0"/>
+              <a:t>Assembly-re könnyebb fordítani, mint közvetlen gépi kódra (mivel már eggyel magasabb szintű absztrakció)</a:t>
+            </a:r>
+          </a:p>
+          <a:p>
+            <a:r>
+              <a:rPr lang="hu-HU" dirty="0"/>
+              <a:t>Így a „magasabb szintű” nyelvek már csak arra fordulnak. (C, Fortan)</a:t>
+            </a:r>
           </a:p>
           <a:p>
             <a:r>
@@ -6313,20 +6080,15 @@
             <a:pPr lvl="1"/>
             <a:r>
               <a:rPr lang="hu-HU" dirty="0"/>
-              <a:t>Típusok (pl. Egész számok, valós számok, logikai értékek, stb</a:t>
-            </a:r>
-            <a:r>
-              <a:rPr lang="hu-HU" dirty="0" smtClean="0"/>
-              <a:t>)</a:t>
+              <a:t>Típusok (pl. Egész számok, valós számok, logikai értékek, stb)</a:t>
             </a:r>
           </a:p>
           <a:p>
             <a:pPr lvl="1"/>
             <a:r>
-              <a:rPr lang="hu-HU" dirty="0" smtClean="0"/>
+              <a:rPr lang="hu-HU" dirty="0"/>
               <a:t>Programrészek kiemelése</a:t>
             </a:r>
-            <a:endParaRPr lang="hu-HU" dirty="0"/>
           </a:p>
         </p:txBody>
       </p:sp>

</xml_diff>

<commit_message>
Improve diplomamunka, and abstract ea
</commit_message>
<xml_diff>
--- a/efop/03/Absztakciós szintek a programozásban.pptx
+++ b/efop/03/Absztakciós szintek a programozásban.pptx
@@ -271,7 +271,7 @@
           <a:p>
             <a:fld id="{2BC316B3-8804-47C0-8326-0629B3A2E3D7}" type="datetimeFigureOut">
               <a:rPr lang="hu-HU" smtClean="0"/>
-              <a:t>2018. 10. 05.</a:t>
+              <a:t>2018. 10. 08.</a:t>
             </a:fld>
             <a:endParaRPr lang="hu-HU"/>
           </a:p>
@@ -441,7 +441,7 @@
           <a:p>
             <a:fld id="{2BC316B3-8804-47C0-8326-0629B3A2E3D7}" type="datetimeFigureOut">
               <a:rPr lang="hu-HU" smtClean="0"/>
-              <a:t>2018. 10. 05.</a:t>
+              <a:t>2018. 10. 08.</a:t>
             </a:fld>
             <a:endParaRPr lang="hu-HU"/>
           </a:p>
@@ -621,7 +621,7 @@
           <a:p>
             <a:fld id="{2BC316B3-8804-47C0-8326-0629B3A2E3D7}" type="datetimeFigureOut">
               <a:rPr lang="hu-HU" smtClean="0"/>
-              <a:t>2018. 10. 05.</a:t>
+              <a:t>2018. 10. 08.</a:t>
             </a:fld>
             <a:endParaRPr lang="hu-HU"/>
           </a:p>
@@ -791,7 +791,7 @@
           <a:p>
             <a:fld id="{2BC316B3-8804-47C0-8326-0629B3A2E3D7}" type="datetimeFigureOut">
               <a:rPr lang="hu-HU" smtClean="0"/>
-              <a:t>2018. 10. 05.</a:t>
+              <a:t>2018. 10. 08.</a:t>
             </a:fld>
             <a:endParaRPr lang="hu-HU"/>
           </a:p>
@@ -1037,7 +1037,7 @@
           <a:p>
             <a:fld id="{2BC316B3-8804-47C0-8326-0629B3A2E3D7}" type="datetimeFigureOut">
               <a:rPr lang="hu-HU" smtClean="0"/>
-              <a:t>2018. 10. 05.</a:t>
+              <a:t>2018. 10. 08.</a:t>
             </a:fld>
             <a:endParaRPr lang="hu-HU"/>
           </a:p>
@@ -1269,7 +1269,7 @@
           <a:p>
             <a:fld id="{2BC316B3-8804-47C0-8326-0629B3A2E3D7}" type="datetimeFigureOut">
               <a:rPr lang="hu-HU" smtClean="0"/>
-              <a:t>2018. 10. 05.</a:t>
+              <a:t>2018. 10. 08.</a:t>
             </a:fld>
             <a:endParaRPr lang="hu-HU"/>
           </a:p>
@@ -1636,7 +1636,7 @@
           <a:p>
             <a:fld id="{2BC316B3-8804-47C0-8326-0629B3A2E3D7}" type="datetimeFigureOut">
               <a:rPr lang="hu-HU" smtClean="0"/>
-              <a:t>2018. 10. 05.</a:t>
+              <a:t>2018. 10. 08.</a:t>
             </a:fld>
             <a:endParaRPr lang="hu-HU"/>
           </a:p>
@@ -1754,7 +1754,7 @@
           <a:p>
             <a:fld id="{2BC316B3-8804-47C0-8326-0629B3A2E3D7}" type="datetimeFigureOut">
               <a:rPr lang="hu-HU" smtClean="0"/>
-              <a:t>2018. 10. 05.</a:t>
+              <a:t>2018. 10. 08.</a:t>
             </a:fld>
             <a:endParaRPr lang="hu-HU"/>
           </a:p>
@@ -1849,7 +1849,7 @@
           <a:p>
             <a:fld id="{2BC316B3-8804-47C0-8326-0629B3A2E3D7}" type="datetimeFigureOut">
               <a:rPr lang="hu-HU" smtClean="0"/>
-              <a:t>2018. 10. 05.</a:t>
+              <a:t>2018. 10. 08.</a:t>
             </a:fld>
             <a:endParaRPr lang="hu-HU"/>
           </a:p>
@@ -2126,7 +2126,7 @@
           <a:p>
             <a:fld id="{2BC316B3-8804-47C0-8326-0629B3A2E3D7}" type="datetimeFigureOut">
               <a:rPr lang="hu-HU" smtClean="0"/>
-              <a:t>2018. 10. 05.</a:t>
+              <a:t>2018. 10. 08.</a:t>
             </a:fld>
             <a:endParaRPr lang="hu-HU"/>
           </a:p>
@@ -2379,7 +2379,7 @@
           <a:p>
             <a:fld id="{2BC316B3-8804-47C0-8326-0629B3A2E3D7}" type="datetimeFigureOut">
               <a:rPr lang="hu-HU" smtClean="0"/>
-              <a:t>2018. 10. 05.</a:t>
+              <a:t>2018. 10. 08.</a:t>
             </a:fld>
             <a:endParaRPr lang="hu-HU"/>
           </a:p>
@@ -2597,7 +2597,7 @@
           <a:p>
             <a:fld id="{2BC316B3-8804-47C0-8326-0629B3A2E3D7}" type="datetimeFigureOut">
               <a:rPr lang="hu-HU" smtClean="0"/>
-              <a:t>2018. 10. 05.</a:t>
+              <a:t>2018. 10. 08.</a:t>
             </a:fld>
             <a:endParaRPr lang="hu-HU"/>
           </a:p>
@@ -3166,13 +3166,13 @@
           <a:p>
             <a:r>
               <a:rPr lang="hu-HU" sz="3200" dirty="0"/>
-              <a:t>Nincsenek regiszterek, csak általunk elnvezett tárterületek</a:t>
+              <a:t>Nincsenek regiszterek, csak általunk elnevezett tárterületek</a:t>
             </a:r>
           </a:p>
           <a:p>
             <a:r>
               <a:rPr lang="hu-HU" sz="3200" dirty="0"/>
-              <a:t>Értékadás: Egy általam felcimkézett tárteülernek értéket adok</a:t>
+              <a:t>Értékadás: Egy általam felcímkézett tárterületnek értéket adok</a:t>
             </a:r>
           </a:p>
           <a:p>
@@ -3531,7 +3531,7 @@
                   <a:rPr lang="nn-NO" i="1" dirty="0">
                     <a:cs typeface="Courier New" panose="02070309020205020404" pitchFamily="49" charset="0"/>
                   </a:rPr>
-                  <a:t>sum += t[i];</a:t>
+                  <a:t>sum += i;</a:t>
                 </a:r>
               </a:p>
             </p:txBody>
@@ -3623,7 +3623,7 @@
             <a:p>
               <a:r>
                 <a:rPr lang="hu-HU" dirty="0"/>
-                <a:t>Fordítóprogram</a:t>
+                <a:t>Kódgenerátor</a:t>
               </a:r>
             </a:p>
           </p:txBody>
@@ -3682,8 +3682,21 @@
           <a:p>
             <a:r>
               <a:rPr lang="hu-HU" i="1" dirty="0"/>
-              <a:t>add eax,[ebx+4*ecx]</a:t>
-            </a:r>
+              <a:t>add </a:t>
+            </a:r>
+            <a:r>
+              <a:rPr lang="hu-HU" i="1" dirty="0" err="1"/>
+              <a:t>eax</a:t>
+            </a:r>
+            <a:r>
+              <a:rPr lang="hu-HU" i="1" dirty="0"/>
+              <a:t>, </a:t>
+            </a:r>
+            <a:r>
+              <a:rPr lang="hu-HU" i="1" dirty="0" err="1"/>
+              <a:t>ecx</a:t>
+            </a:r>
+            <a:endParaRPr lang="hu-HU" i="1" dirty="0"/>
           </a:p>
           <a:p>
             <a:r>
@@ -3790,19 +3803,19 @@
           <a:p>
             <a:r>
               <a:rPr lang="hu-HU" sz="2200" dirty="0"/>
-              <a:t>Saját típusokat és típusműveleteket adhatok meg: pl: autó, mint típus, melynek egy típusművelete lehet pl az, hogy autó beindítása</a:t>
+              <a:t>Saját típusokat és típusműveleteket adhatok meg: pl: autó, mint típus, melynek egy típusművelete lehet pl. az, hogy autó beindítása</a:t>
             </a:r>
           </a:p>
           <a:p>
             <a:r>
               <a:rPr lang="hu-HU" sz="2200" dirty="0"/>
-              <a:t>Ez alatt strukturákat kell érteni (pl. Ha emberek adatait szeretnék tárolni összefogjuk egy struktúrába, így a kódban egységesen tudjuk kezelni őket )</a:t>
+              <a:t>Ez alatt strukturákat kell érteni (pl. Ha emberek adatait szeretnénk tárolni összefogjuk egy struktúrába, így a kódban egységesen tudjuk kezelni őket )</a:t>
             </a:r>
           </a:p>
           <a:p>
             <a:r>
               <a:rPr lang="hu-HU" sz="2200" dirty="0"/>
-              <a:t>Absztrakció: Egyre jobban ki tudom fejezni a modellezett fogalmakat a programban, pl. egy autós játékban a programkódban meg fog jelenni az autó entitás, és a játékos által vezérzet műveletek pedig meg fognak jelenni típusműveletként. (Ilyen nyelvek pl. C++, Java, C#)</a:t>
+              <a:t>Absztrakció: Egyre jobban ki tudom fejezni a modellezett fogalmakat a programban, pl. egy autós játékban a programkódban meg fog jelenni az autó entitás, és a játékos által vezérelt műveletek pedig meg fognak jelenni típusműveletként. (Ilyen nyelvek pl. C++, Java, C#)</a:t>
             </a:r>
           </a:p>
         </p:txBody>
@@ -3815,8 +3828,8 @@
         </p:nvSpPr>
         <p:spPr>
           <a:xfrm>
-            <a:off x="6752065" y="3687901"/>
-            <a:ext cx="2781836" cy="3170099"/>
+            <a:off x="5196397" y="3687901"/>
+            <a:ext cx="3685733" cy="3170099"/>
           </a:xfrm>
           <a:prstGeom prst="rect">
             <a:avLst/>
@@ -3845,8 +3858,12 @@
           </a:p>
           <a:p>
             <a:r>
+              <a:rPr lang="hu-HU" sz="2000" dirty="0" err="1"/>
+              <a:t>egyáb</a:t>
+            </a:r>
+            <a:r>
               <a:rPr lang="hu-HU" sz="2000" dirty="0"/>
-              <a:t>egyeb valtozok, melyek reprezentaljak az autot..</a:t>
+              <a:t> adattagok, melyek reprezentaljak az autot..</a:t>
             </a:r>
           </a:p>
           <a:p>
@@ -3992,8 +4009,8 @@
         </p:nvSpPr>
         <p:spPr>
           <a:xfrm>
-            <a:off x="838200" y="1727531"/>
-            <a:ext cx="10515600" cy="4351338"/>
+            <a:off x="838200" y="1792007"/>
+            <a:ext cx="10515600" cy="4731885"/>
           </a:xfrm>
         </p:spPr>
         <p:txBody>
@@ -4040,13 +4057,21 @@
           <a:p>
             <a:r>
               <a:rPr lang="hu-HU" dirty="0"/>
-              <a:t>Az absztrakció itt abban van, hogy a tervrajz teljesen nyelvüfggettlen, nagyon jól átlátható, könnyen érhető, közel áll az emberi gondolkodáshoz. </a:t>
-            </a:r>
-          </a:p>
-          <a:p>
-            <a:r>
-              <a:rPr lang="hu-HU" dirty="0"/>
-              <a:t>Ezen a szinten nem foglalkozunk programozási nyelvekkel, kódokkal, ezeket elhanyagoljunk, a lényeg a modellezet fogalmakon van (pl. Az auton)</a:t>
+              <a:t>Az absztrakció itt abban van, hogy a tervrajz teljesen </a:t>
+            </a:r>
+            <a:r>
+              <a:rPr lang="hu-HU" dirty="0" err="1"/>
+              <a:t>nyelvfüggettlen</a:t>
+            </a:r>
+            <a:r>
+              <a:rPr lang="hu-HU" dirty="0"/>
+              <a:t>, jól átlátható, könnyen érhető, közel áll az emberi gondolkodáshoz. </a:t>
+            </a:r>
+          </a:p>
+          <a:p>
+            <a:r>
+              <a:rPr lang="hu-HU" dirty="0"/>
+              <a:t>Ezen a szinten nem foglalkozunk programozási nyelvekkel, kódokkal, ezeket elhanyagoljunk, a lényeg a modellezett fogalmakon van (pl. Az autón)</a:t>
             </a:r>
           </a:p>
           <a:p>
@@ -4102,7 +4127,7 @@
         </p:nvSpPr>
         <p:spPr>
           <a:xfrm>
-            <a:off x="735169" y="56287"/>
+            <a:off x="-1913029" y="98278"/>
             <a:ext cx="10515600" cy="1325563"/>
           </a:xfrm>
         </p:spPr>
@@ -4110,7 +4135,7 @@
           <a:bodyPr/>
           <a:lstStyle/>
           <a:p>
-            <a:pPr algn="ctr"/>
+            <a:pPr algn="r"/>
             <a:r>
               <a:rPr lang="hu-HU" dirty="0"/>
               <a:t>Példa egy tervre</a:t>
@@ -4170,8 +4195,8 @@
         </p:blipFill>
         <p:spPr>
           <a:xfrm>
-            <a:off x="4099911" y="2398574"/>
-            <a:ext cx="8001000" cy="3894250"/>
+            <a:off x="4052853" y="2118463"/>
+            <a:ext cx="8001000" cy="3978477"/>
           </a:xfrm>
           <a:prstGeom prst="rect">
             <a:avLst/>
@@ -4215,8 +4240,8 @@
         </p:nvSpPr>
         <p:spPr>
           <a:xfrm>
-            <a:off x="4237151" y="1690688"/>
-            <a:ext cx="2202286" cy="707886"/>
+            <a:off x="4052853" y="1375019"/>
+            <a:ext cx="3248034" cy="707886"/>
           </a:xfrm>
           <a:prstGeom prst="rect">
             <a:avLst/>
@@ -4231,7 +4256,209 @@
           <a:p>
             <a:r>
               <a:rPr lang="hu-HU" sz="2000" dirty="0"/>
-              <a:t>Program működést is tervezhetünk</a:t>
+              <a:t>Program működést is tervezhetünk (állapotgép)</a:t>
+            </a:r>
+          </a:p>
+        </p:txBody>
+      </p:sp>
+      <p:sp>
+        <p:nvSpPr>
+          <p:cNvPr id="3" name="Szövegdoboz 2">
+            <a:extLst>
+              <a:ext uri="{FF2B5EF4-FFF2-40B4-BE49-F238E27FC236}">
+                <a16:creationId xmlns:a16="http://schemas.microsoft.com/office/drawing/2014/main" id="{4B343789-D827-43DE-8433-48E3661E5A93}"/>
+              </a:ext>
+            </a:extLst>
+          </p:cNvPr>
+          <p:cNvSpPr txBox="1"/>
+          <p:nvPr/>
+        </p:nvSpPr>
+        <p:spPr>
+          <a:xfrm>
+            <a:off x="4097194" y="4527280"/>
+            <a:ext cx="1314794" cy="1569660"/>
+          </a:xfrm>
+          <a:prstGeom prst="rect">
+            <a:avLst/>
+          </a:prstGeom>
+          <a:noFill/>
+        </p:spPr>
+        <p:txBody>
+          <a:bodyPr wrap="square" rtlCol="0">
+            <a:spAutoFit/>
+          </a:bodyPr>
+          <a:lstStyle/>
+          <a:p>
+            <a:r>
+              <a:rPr lang="hu-HU" sz="1600" dirty="0" err="1"/>
+              <a:t>beindit</a:t>
+            </a:r>
+            <a:r>
+              <a:rPr lang="hu-HU" sz="1600" dirty="0"/>
+              <a:t>() {</a:t>
+            </a:r>
+          </a:p>
+          <a:p>
+            <a:r>
+              <a:rPr lang="hu-HU" sz="1600" dirty="0" err="1"/>
+              <a:t>If</a:t>
+            </a:r>
+            <a:r>
+              <a:rPr lang="hu-HU" sz="1600" dirty="0"/>
+              <a:t>(</a:t>
+            </a:r>
+            <a:r>
+              <a:rPr lang="hu-HU" sz="1600" dirty="0" err="1"/>
+              <a:t>all</a:t>
+            </a:r>
+            <a:r>
+              <a:rPr lang="hu-HU" sz="1600" dirty="0"/>
+              <a:t>) {</a:t>
+            </a:r>
+          </a:p>
+          <a:p>
+            <a:r>
+              <a:rPr lang="hu-HU" sz="1600" dirty="0" err="1"/>
+              <a:t>all</a:t>
+            </a:r>
+            <a:r>
+              <a:rPr lang="hu-HU" sz="1600" dirty="0"/>
+              <a:t> = </a:t>
+            </a:r>
+            <a:r>
+              <a:rPr lang="hu-HU" sz="1600" dirty="0" err="1"/>
+              <a:t>false</a:t>
+            </a:r>
+            <a:r>
+              <a:rPr lang="hu-HU" sz="1600" dirty="0"/>
+              <a:t>;</a:t>
+            </a:r>
+          </a:p>
+          <a:p>
+            <a:r>
+              <a:rPr lang="hu-HU" sz="1600" dirty="0" err="1"/>
+              <a:t>egyeb</a:t>
+            </a:r>
+            <a:r>
+              <a:rPr lang="hu-HU" sz="1600" dirty="0"/>
+              <a:t>..</a:t>
+            </a:r>
+          </a:p>
+          <a:p>
+            <a:r>
+              <a:rPr lang="hu-HU" sz="1600" dirty="0"/>
+              <a:t>}</a:t>
+            </a:r>
+          </a:p>
+          <a:p>
+            <a:r>
+              <a:rPr lang="hu-HU" sz="1600" dirty="0"/>
+              <a:t>}</a:t>
+            </a:r>
+          </a:p>
+        </p:txBody>
+      </p:sp>
+      <p:sp>
+        <p:nvSpPr>
+          <p:cNvPr id="8" name="Szövegdoboz 7">
+            <a:extLst>
+              <a:ext uri="{FF2B5EF4-FFF2-40B4-BE49-F238E27FC236}">
+                <a16:creationId xmlns:a16="http://schemas.microsoft.com/office/drawing/2014/main" id="{419D6D56-ACAF-4251-A470-E91C267F3799}"/>
+              </a:ext>
+            </a:extLst>
+          </p:cNvPr>
+          <p:cNvSpPr txBox="1"/>
+          <p:nvPr/>
+        </p:nvSpPr>
+        <p:spPr>
+          <a:xfrm>
+            <a:off x="5411987" y="4529382"/>
+            <a:ext cx="1469763" cy="1569660"/>
+          </a:xfrm>
+          <a:prstGeom prst="rect">
+            <a:avLst/>
+          </a:prstGeom>
+          <a:noFill/>
+        </p:spPr>
+        <p:txBody>
+          <a:bodyPr wrap="square" rtlCol="0">
+            <a:spAutoFit/>
+          </a:bodyPr>
+          <a:lstStyle/>
+          <a:p>
+            <a:r>
+              <a:rPr lang="hu-HU" sz="1600" dirty="0" err="1"/>
+              <a:t>beindit</a:t>
+            </a:r>
+            <a:r>
+              <a:rPr lang="hu-HU" sz="1600" dirty="0"/>
+              <a:t>() {</a:t>
+            </a:r>
+          </a:p>
+          <a:p>
+            <a:r>
+              <a:rPr lang="hu-HU" sz="1600" dirty="0" err="1"/>
+              <a:t>If</a:t>
+            </a:r>
+            <a:r>
+              <a:rPr lang="hu-HU" sz="1600" dirty="0"/>
+              <a:t>(</a:t>
+            </a:r>
+            <a:r>
+              <a:rPr lang="hu-HU" sz="1600" dirty="0" err="1"/>
+              <a:t>state</a:t>
+            </a:r>
+            <a:r>
+              <a:rPr lang="hu-HU" sz="1600" dirty="0"/>
+              <a:t> == </a:t>
+            </a:r>
+            <a:r>
+              <a:rPr lang="hu-HU" sz="1600" dirty="0" err="1"/>
+              <a:t>all</a:t>
+            </a:r>
+            <a:r>
+              <a:rPr lang="hu-HU" sz="1600" dirty="0"/>
+              <a:t>){</a:t>
+            </a:r>
+          </a:p>
+          <a:p>
+            <a:r>
+              <a:rPr lang="hu-HU" sz="1600" dirty="0" err="1"/>
+              <a:t>state</a:t>
+            </a:r>
+            <a:r>
+              <a:rPr lang="hu-HU" sz="1600" dirty="0"/>
+              <a:t> = </a:t>
+            </a:r>
+            <a:r>
+              <a:rPr lang="hu-HU" sz="1600" dirty="0" err="1"/>
+              <a:t>jar</a:t>
+            </a:r>
+            <a:r>
+              <a:rPr lang="hu-HU" sz="1600" dirty="0"/>
+              <a:t>;</a:t>
+            </a:r>
+          </a:p>
+          <a:p>
+            <a:r>
+              <a:rPr lang="hu-HU" sz="1600" dirty="0" err="1"/>
+              <a:t>egyeb</a:t>
+            </a:r>
+            <a:r>
+              <a:rPr lang="hu-HU" sz="1600" dirty="0"/>
+              <a:t>..</a:t>
+            </a:r>
+          </a:p>
+          <a:p>
+            <a:r>
+              <a:rPr lang="hu-HU" sz="1600" dirty="0"/>
+              <a:t>}</a:t>
+            </a:r>
+          </a:p>
+          <a:p>
+            <a:r>
+              <a:rPr lang="hu-HU" sz="1600" dirty="0"/>
+              <a:t>}</a:t>
             </a:r>
           </a:p>
         </p:txBody>
@@ -4341,7 +4568,7 @@
               <a:rPr lang="hu-HU" dirty="0">
                 <a:sym typeface="Wingdings" panose="05000000000000000000" pitchFamily="2" charset="2"/>
               </a:rPr>
-              <a:t>Lefordítjuk a tervet egy megfelelő célnyelvre, pl c++-ra. (lényegében ez is egy fordítóprogram)</a:t>
+              <a:t>Lefordítjuk a tervet egy megfelelő célnyelvre, pl. c++-ra. (lényegében ez is egy fordítóprogram)</a:t>
             </a:r>
           </a:p>
           <a:p>
@@ -4353,7 +4580,7 @@
               <a:rPr lang="hu-HU" dirty="0">
                 <a:sym typeface="Wingdings" panose="05000000000000000000" pitchFamily="2" charset="2"/>
               </a:rPr>
-              <a:t>Írunk egy saját „virtuális gépet” (egy végrehajtó programot), melynek a nyelve nem bináris kód, hanem a tervben szereplő leíróelemek</a:t>
+              <a:t>Írunk egy saját „virtuális gépet” (egy végrehajtó programot), melynek a nyelve nem bináris kód, hanem a tervben szereplő leíróelemek.</a:t>
             </a:r>
           </a:p>
           <a:p>
@@ -4454,13 +4681,13 @@
           <a:p>
             <a:r>
               <a:rPr lang="hu-HU" dirty="0"/>
-              <a:t>Illetve fel lehet használni meglévő techonológiákat, és arra építkezni (a fordítóprogramok is ezt teszik az assembly-vel)</a:t>
-            </a:r>
-          </a:p>
-          <a:p>
-            <a:r>
-              <a:rPr lang="hu-HU" dirty="0"/>
-              <a:t>A nyelvnek nem muszáj általános célú nyelvnek lennie (Nem biztos, hogy mindent ki tudok fejezni vele, pl. Lehet egy robot irányítása tervezem, fel, le, jobbra, blra utasításokkal)</a:t>
+              <a:t>Illetve fel lehet használni meglévő techonológiákat, és arra építkezni (a fordítóprogramok is ezt teszik az Assembly-vel)</a:t>
+            </a:r>
+          </a:p>
+          <a:p>
+            <a:r>
+              <a:rPr lang="hu-HU" dirty="0"/>
+              <a:t>A nyelvnek nem muszáj általános célú nyelvnek lennie (Nem biztos, hogy mindent ki tudok fejezni vele, pl. Lehet egy robot irányítására tervezem, szűk utasításkészlettel)</a:t>
             </a:r>
           </a:p>
           <a:p>
@@ -4681,7 +4908,15 @@
           <a:p>
             <a:r>
               <a:rPr lang="hu-HU" dirty="0"/>
-              <a:t>ELTE, Informatika Kar MS-c hallgatója</a:t>
+              <a:t>ELTE, Informatika Kar </a:t>
+            </a:r>
+            <a:r>
+              <a:rPr lang="hu-HU" dirty="0" err="1"/>
+              <a:t>MSc</a:t>
+            </a:r>
+            <a:r>
+              <a:rPr lang="hu-HU" dirty="0"/>
+              <a:t>-s hallgatója</a:t>
             </a:r>
           </a:p>
           <a:p>
@@ -4780,7 +5015,7 @@
             <a:pPr algn="ctr"/>
             <a:r>
               <a:rPr lang="hu-HU" dirty="0"/>
-              <a:t>Mi az absztakció?</a:t>
+              <a:t>Mi az absztrakció?</a:t>
             </a:r>
           </a:p>
         </p:txBody>
@@ -5000,7 +5235,7 @@
             <a:pPr algn="ctr"/>
             <a:r>
               <a:rPr lang="hu-HU" dirty="0"/>
-              <a:t>A gép kód</a:t>
+              <a:t>A gépi kód</a:t>
             </a:r>
           </a:p>
         </p:txBody>
@@ -5041,7 +5276,7 @@
           <a:p>
             <a:r>
               <a:rPr lang="hu-HU" dirty="0"/>
-              <a:t>Minden bájt egy-egy utasításnak felel meg, ami a processzor közvetlen végre tud hajtani</a:t>
+              <a:t>Minden bájt egy-egy utasításnak felel meg, amit a processzor közvetlen végre tud hajtani</a:t>
             </a:r>
           </a:p>
           <a:p>
@@ -5103,7 +5338,7 @@
                 <a:effectLst/>
                 <a:latin typeface="Arial" panose="020B0604020202020204" pitchFamily="34" charset="0"/>
               </a:rPr>
-              <a:t>-es érték binárisan felírva 1 bájton.</a:t>
+              <a:t>-es érték binárisan felírva 1 bájtban.</a:t>
             </a:r>
           </a:p>
           <a:p>
@@ -5601,13 +5836,13 @@
           <a:p>
             <a:r>
               <a:rPr lang="hu-HU" dirty="0"/>
-              <a:t>Itt jönnnek képbe a fordítórpogramok:</a:t>
-            </a:r>
-          </a:p>
-          <a:p>
-            <a:r>
-              <a:rPr lang="hu-HU" dirty="0"/>
-              <a:t>Nagyon egyszerűen olyan programokról beszélünk, mely egy szöveget egy másik szöveggé alakít</a:t>
+              <a:t>Itt jönnek képbe a fordítóprogramok:</a:t>
+            </a:r>
+          </a:p>
+          <a:p>
+            <a:r>
+              <a:rPr lang="hu-HU" dirty="0"/>
+              <a:t>Nagyon egyszerűen olyan programról beszélünk, mely egy szöveget egy másik szöveggé alakít át</a:t>
             </a:r>
           </a:p>
           <a:p>
@@ -5693,7 +5928,7 @@
               <a:p>
                 <a:r>
                   <a:rPr lang="nn-NO" i="1" dirty="0"/>
-                  <a:t>sum += t[i];</a:t>
+                  <a:t>sum += i;</a:t>
                 </a:r>
               </a:p>
             </p:txBody>
@@ -5967,7 +6202,7 @@
           <a:p>
             <a:r>
               <a:rPr lang="hu-HU" dirty="0"/>
-              <a:t>Fordítóprogramja az Assembler, a szöveges utasításokat gépi utasításokká konverálja</a:t>
+              <a:t>Fordítóprogramja az Assembler, a szöveges utasításokat gépi utasításokká konvertálja</a:t>
             </a:r>
           </a:p>
         </p:txBody>
@@ -6053,13 +6288,13 @@
           <a:p>
             <a:r>
               <a:rPr lang="hu-HU" dirty="0"/>
-              <a:t>Így a „magasabb szintű” nyelvek már csak arra fordulnak. (C, Fortan)</a:t>
-            </a:r>
-          </a:p>
-          <a:p>
-            <a:r>
-              <a:rPr lang="hu-HU" dirty="0"/>
-              <a:t>Mi hiányzik assemblyből?</a:t>
+              <a:t>Így a „magasabb szintű” nyelvek már csak arra fordulnak. (Fortan, C)</a:t>
+            </a:r>
+          </a:p>
+          <a:p>
+            <a:r>
+              <a:rPr lang="hu-HU" dirty="0"/>
+              <a:t>Mi hiányzik az Assemblyből?</a:t>
             </a:r>
           </a:p>
           <a:p>

</xml_diff>